<commit_message>
adding all feedback points
</commit_message>
<xml_diff>
--- a/app/assets/Loriah Pope Portfolio Presentation.pptx
+++ b/app/assets/Loriah Pope Portfolio Presentation.pptx
@@ -17,6 +17,16 @@
     <p:sldId id="267" r:id="rId11"/>
     <p:sldId id="269" r:id="rId12"/>
     <p:sldId id="270" r:id="rId13"/>
+    <p:sldId id="271" r:id="rId14"/>
+    <p:sldId id="272" r:id="rId15"/>
+    <p:sldId id="273" r:id="rId16"/>
+    <p:sldId id="274" r:id="rId17"/>
+    <p:sldId id="275" r:id="rId18"/>
+    <p:sldId id="276" r:id="rId19"/>
+    <p:sldId id="277" r:id="rId20"/>
+    <p:sldId id="280" r:id="rId21"/>
+    <p:sldId id="281" r:id="rId22"/>
+    <p:sldId id="278" r:id="rId23"/>
   </p:sldIdLst>
   <p:sldSz cx="9144000" cy="5143500" type="screen16x9"/>
   <p:notesSz cx="6858000" cy="9144000"/>
@@ -302,7 +312,7 @@
           <a:p>
             <a:fld id="{ECA7E715-9C78-EF44-915E-F00429523671}" type="datetimeFigureOut">
               <a:rPr lang="en-US" smtClean="0"/>
-              <a:t>8/19/17</a:t>
+              <a:t>8/20/17</a:t>
             </a:fld>
             <a:endParaRPr lang="en-US"/>
           </a:p>
@@ -480,7 +490,7 @@
           <a:p>
             <a:fld id="{ECA7E715-9C78-EF44-915E-F00429523671}" type="datetimeFigureOut">
               <a:rPr lang="en-US" smtClean="0"/>
-              <a:t>8/19/17</a:t>
+              <a:t>8/20/17</a:t>
             </a:fld>
             <a:endParaRPr lang="en-US"/>
           </a:p>
@@ -663,7 +673,7 @@
           <a:p>
             <a:fld id="{ECA7E715-9C78-EF44-915E-F00429523671}" type="datetimeFigureOut">
               <a:rPr lang="en-US" smtClean="0"/>
-              <a:t>8/19/17</a:t>
+              <a:t>8/20/17</a:t>
             </a:fld>
             <a:endParaRPr lang="en-US"/>
           </a:p>
@@ -815,7 +825,7 @@
           <a:p>
             <a:fld id="{ECA7E715-9C78-EF44-915E-F00429523671}" type="datetimeFigureOut">
               <a:rPr lang="en-US" smtClean="0"/>
-              <a:t>8/19/17</a:t>
+              <a:t>8/20/17</a:t>
             </a:fld>
             <a:endParaRPr lang="en-US"/>
           </a:p>
@@ -1064,7 +1074,7 @@
           <a:p>
             <a:fld id="{ECA7E715-9C78-EF44-915E-F00429523671}" type="datetimeFigureOut">
               <a:rPr lang="en-US" smtClean="0"/>
-              <a:t>8/19/17</a:t>
+              <a:t>8/20/17</a:t>
             </a:fld>
             <a:endParaRPr lang="en-US"/>
           </a:p>
@@ -1360,7 +1370,7 @@
           <a:p>
             <a:fld id="{ECA7E715-9C78-EF44-915E-F00429523671}" type="datetimeFigureOut">
               <a:rPr lang="en-US" smtClean="0"/>
-              <a:t>8/19/17</a:t>
+              <a:t>8/20/17</a:t>
             </a:fld>
             <a:endParaRPr lang="en-US"/>
           </a:p>
@@ -1790,7 +1800,7 @@
           <a:p>
             <a:fld id="{ECA7E715-9C78-EF44-915E-F00429523671}" type="datetimeFigureOut">
               <a:rPr lang="en-US" smtClean="0"/>
-              <a:t>8/19/17</a:t>
+              <a:t>8/20/17</a:t>
             </a:fld>
             <a:endParaRPr lang="en-US"/>
           </a:p>
@@ -1916,7 +1926,7 @@
           <a:p>
             <a:fld id="{ECA7E715-9C78-EF44-915E-F00429523671}" type="datetimeFigureOut">
               <a:rPr lang="en-US" smtClean="0"/>
-              <a:t>8/19/17</a:t>
+              <a:t>8/20/17</a:t>
             </a:fld>
             <a:endParaRPr lang="en-US"/>
           </a:p>
@@ -2011,7 +2021,7 @@
           <a:p>
             <a:fld id="{ECA7E715-9C78-EF44-915E-F00429523671}" type="datetimeFigureOut">
               <a:rPr lang="en-US" smtClean="0"/>
-              <a:t>8/19/17</a:t>
+              <a:t>8/20/17</a:t>
             </a:fld>
             <a:endParaRPr lang="en-US"/>
           </a:p>
@@ -2291,7 +2301,7 @@
           <a:p>
             <a:fld id="{ECA7E715-9C78-EF44-915E-F00429523671}" type="datetimeFigureOut">
               <a:rPr lang="en-US" smtClean="0"/>
-              <a:t>8/19/17</a:t>
+              <a:t>8/20/17</a:t>
             </a:fld>
             <a:endParaRPr lang="en-US"/>
           </a:p>
@@ -2547,7 +2557,7 @@
           <a:p>
             <a:fld id="{ECA7E715-9C78-EF44-915E-F00429523671}" type="datetimeFigureOut">
               <a:rPr lang="en-US" smtClean="0"/>
-              <a:t>8/19/17</a:t>
+              <a:t>8/20/17</a:t>
             </a:fld>
             <a:endParaRPr lang="en-US"/>
           </a:p>
@@ -2730,7 +2740,7 @@
           <a:p>
             <a:fld id="{ECA7E715-9C78-EF44-915E-F00429523671}" type="datetimeFigureOut">
               <a:rPr lang="en-US" smtClean="0"/>
-              <a:t>8/19/17</a:t>
+              <a:t>8/20/17</a:t>
             </a:fld>
             <a:endParaRPr lang="en-US"/>
           </a:p>
@@ -3623,6 +3633,2568 @@
 </p:sld>
 </file>
 
+<file path=ppt/slides/slide13.xml><?xml version="1.0" encoding="utf-8"?>
+<p:sld xmlns:a="http://schemas.openxmlformats.org/drawingml/2006/main" xmlns:r="http://schemas.openxmlformats.org/officeDocument/2006/relationships" xmlns:p="http://schemas.openxmlformats.org/presentationml/2006/main">
+  <p:cSld>
+    <p:spTree>
+      <p:nvGrpSpPr>
+        <p:cNvPr id="1" name=""/>
+        <p:cNvGrpSpPr/>
+        <p:nvPr/>
+      </p:nvGrpSpPr>
+      <p:grpSpPr>
+        <a:xfrm>
+          <a:off x="0" y="0"/>
+          <a:ext cx="0" cy="0"/>
+          <a:chOff x="0" y="0"/>
+          <a:chExt cx="0" cy="0"/>
+        </a:xfrm>
+      </p:grpSpPr>
+      <p:sp>
+        <p:nvSpPr>
+          <p:cNvPr id="2" name="Content Placeholder 1"/>
+          <p:cNvSpPr>
+            <a:spLocks noGrp="1"/>
+          </p:cNvSpPr>
+          <p:nvPr>
+            <p:ph idx="1"/>
+          </p:nvPr>
+        </p:nvSpPr>
+        <p:spPr>
+          <a:xfrm>
+            <a:off x="457200" y="2094000"/>
+            <a:ext cx="8229600" cy="955500"/>
+          </a:xfrm>
+        </p:spPr>
+        <p:txBody>
+          <a:bodyPr/>
+          <a:lstStyle/>
+          <a:p>
+            <a:pPr marL="0" indent="0" algn="ctr">
+              <a:buNone/>
+            </a:pPr>
+            <a:r>
+              <a:rPr lang="en-US" sz="1400" dirty="0" smtClean="0"/>
+              <a:t>Project 1</a:t>
+            </a:r>
+          </a:p>
+          <a:p>
+            <a:pPr marL="0" indent="0" algn="ctr">
+              <a:buNone/>
+            </a:pPr>
+            <a:r>
+              <a:rPr lang="en-US" dirty="0" smtClean="0">
+                <a:latin typeface="Lato Black"/>
+                <a:cs typeface="Lato Black"/>
+              </a:rPr>
+              <a:t>Employee </a:t>
+            </a:r>
+            <a:r>
+              <a:rPr lang="en-US" dirty="0" smtClean="0">
+                <a:latin typeface="Lato Black"/>
+                <a:cs typeface="Lato Black"/>
+              </a:rPr>
+              <a:t>Idea Submission</a:t>
+            </a:r>
+            <a:endParaRPr lang="en-US" dirty="0">
+              <a:latin typeface="Lato Black"/>
+              <a:cs typeface="Lato Black"/>
+            </a:endParaRPr>
+          </a:p>
+        </p:txBody>
+      </p:sp>
+    </p:spTree>
+    <p:extLst>
+      <p:ext uri="{BB962C8B-B14F-4D97-AF65-F5344CB8AC3E}">
+        <p14:creationId xmlns:p14="http://schemas.microsoft.com/office/powerpoint/2010/main" val="4145840857"/>
+      </p:ext>
+    </p:extLst>
+  </p:cSld>
+  <p:clrMapOvr>
+    <a:masterClrMapping/>
+  </p:clrMapOvr>
+  <p:timing>
+    <p:tnLst>
+      <p:par>
+        <p:cTn xmlns:p14="http://schemas.microsoft.com/office/powerpoint/2010/main" id="1" dur="indefinite" restart="never" nodeType="tmRoot"/>
+      </p:par>
+    </p:tnLst>
+  </p:timing>
+</p:sld>
+</file>
+
+<file path=ppt/slides/slide14.xml><?xml version="1.0" encoding="utf-8"?>
+<p:sld xmlns:a="http://schemas.openxmlformats.org/drawingml/2006/main" xmlns:r="http://schemas.openxmlformats.org/officeDocument/2006/relationships" xmlns:p="http://schemas.openxmlformats.org/presentationml/2006/main">
+  <p:cSld>
+    <p:spTree>
+      <p:nvGrpSpPr>
+        <p:cNvPr id="1" name=""/>
+        <p:cNvGrpSpPr/>
+        <p:nvPr/>
+      </p:nvGrpSpPr>
+      <p:grpSpPr>
+        <a:xfrm>
+          <a:off x="0" y="0"/>
+          <a:ext cx="0" cy="0"/>
+          <a:chOff x="0" y="0"/>
+          <a:chExt cx="0" cy="0"/>
+        </a:xfrm>
+      </p:grpSpPr>
+      <p:sp>
+        <p:nvSpPr>
+          <p:cNvPr id="2" name="Content Placeholder 1"/>
+          <p:cNvSpPr>
+            <a:spLocks noGrp="1"/>
+          </p:cNvSpPr>
+          <p:nvPr>
+            <p:ph idx="1"/>
+          </p:nvPr>
+        </p:nvSpPr>
+        <p:spPr>
+          <a:xfrm>
+            <a:off x="457200" y="874513"/>
+            <a:ext cx="8229600" cy="3581909"/>
+          </a:xfrm>
+        </p:spPr>
+        <p:txBody>
+          <a:bodyPr>
+            <a:normAutofit fontScale="70000" lnSpcReduction="20000"/>
+          </a:bodyPr>
+          <a:lstStyle/>
+          <a:p>
+            <a:pPr marL="0" indent="0">
+              <a:buNone/>
+            </a:pPr>
+            <a:r>
+              <a:rPr lang="en-US" sz="2000" dirty="0" smtClean="0"/>
+              <a:t>Brief</a:t>
+            </a:r>
+          </a:p>
+          <a:p>
+            <a:pPr marL="0" indent="0">
+              <a:buNone/>
+            </a:pPr>
+            <a:r>
+              <a:rPr lang="en-US" sz="3900" dirty="0"/>
+              <a:t>The Idea Portal currently exists as a platform for employees to submit innovative solutions that will </a:t>
+            </a:r>
+            <a:r>
+              <a:rPr lang="en-US" sz="3900" dirty="0">
+                <a:latin typeface="Lato Black"/>
+                <a:cs typeface="Lato Black"/>
+              </a:rPr>
+              <a:t>improve the operations of the company</a:t>
+            </a:r>
+            <a:r>
+              <a:rPr lang="en-US" sz="3900" dirty="0"/>
+              <a:t>.</a:t>
+            </a:r>
+          </a:p>
+          <a:p>
+            <a:pPr marL="0" indent="0">
+              <a:buNone/>
+            </a:pPr>
+            <a:endParaRPr lang="en-US" sz="3900" dirty="0"/>
+          </a:p>
+          <a:p>
+            <a:pPr marL="0" indent="0">
+              <a:buNone/>
+            </a:pPr>
+            <a:r>
+              <a:rPr lang="en-US" sz="3900" dirty="0" smtClean="0"/>
+              <a:t>I was the primary </a:t>
+            </a:r>
+            <a:r>
+              <a:rPr lang="en-US" sz="3900" dirty="0" smtClean="0">
+                <a:latin typeface="Lato Black"/>
+                <a:cs typeface="Lato Black"/>
+              </a:rPr>
+              <a:t>User Experience </a:t>
+            </a:r>
+            <a:r>
+              <a:rPr lang="en-US" sz="3900" dirty="0" smtClean="0">
+                <a:latin typeface="Lato Black"/>
+                <a:cs typeface="Lato Black"/>
+              </a:rPr>
+              <a:t>Designer. </a:t>
+            </a:r>
+            <a:r>
+              <a:rPr lang="en-US" sz="3900" dirty="0"/>
+              <a:t>In addition to completing a </a:t>
+            </a:r>
+            <a:r>
+              <a:rPr lang="en-US" sz="3900" dirty="0">
+                <a:latin typeface="Lato Black"/>
+                <a:cs typeface="Lato Black"/>
+              </a:rPr>
+              <a:t>heuristic review </a:t>
+            </a:r>
+            <a:r>
+              <a:rPr lang="en-US" sz="3900" dirty="0"/>
+              <a:t>of the existing portal, I </a:t>
+            </a:r>
+            <a:r>
+              <a:rPr lang="en-US" sz="3900" dirty="0">
+                <a:latin typeface="Lato Black"/>
+                <a:cs typeface="Lato Black"/>
+              </a:rPr>
+              <a:t>interviewed</a:t>
+            </a:r>
+            <a:r>
+              <a:rPr lang="en-US" sz="3900" dirty="0"/>
+              <a:t> many users of the current site to understand their </a:t>
+            </a:r>
+            <a:r>
+              <a:rPr lang="en-US" sz="3900" dirty="0">
+                <a:latin typeface="Lato Black"/>
+                <a:cs typeface="Lato Black"/>
+              </a:rPr>
+              <a:t>pain points </a:t>
+            </a:r>
+            <a:r>
+              <a:rPr lang="en-US" sz="3900" dirty="0"/>
+              <a:t>and difficulties in </a:t>
+            </a:r>
+            <a:r>
+              <a:rPr lang="en-US" sz="3900" dirty="0" smtClean="0"/>
+              <a:t>preparation </a:t>
+            </a:r>
+            <a:r>
+              <a:rPr lang="en-US" sz="3900" dirty="0"/>
+              <a:t>for designing the new system.</a:t>
+            </a:r>
+          </a:p>
+          <a:p>
+            <a:endParaRPr lang="en-US" dirty="0"/>
+          </a:p>
+        </p:txBody>
+      </p:sp>
+    </p:spTree>
+    <p:extLst>
+      <p:ext uri="{BB962C8B-B14F-4D97-AF65-F5344CB8AC3E}">
+        <p14:creationId xmlns:p14="http://schemas.microsoft.com/office/powerpoint/2010/main" val="600810228"/>
+      </p:ext>
+    </p:extLst>
+  </p:cSld>
+  <p:clrMapOvr>
+    <a:masterClrMapping/>
+  </p:clrMapOvr>
+  <p:timing>
+    <p:tnLst>
+      <p:par>
+        <p:cTn xmlns:p14="http://schemas.microsoft.com/office/powerpoint/2010/main" id="1" dur="indefinite" restart="never" nodeType="tmRoot"/>
+      </p:par>
+    </p:tnLst>
+  </p:timing>
+</p:sld>
+</file>
+
+<file path=ppt/slides/slide15.xml><?xml version="1.0" encoding="utf-8"?>
+<p:sld xmlns:a="http://schemas.openxmlformats.org/drawingml/2006/main" xmlns:r="http://schemas.openxmlformats.org/officeDocument/2006/relationships" xmlns:p="http://schemas.openxmlformats.org/presentationml/2006/main">
+  <p:cSld>
+    <p:spTree>
+      <p:nvGrpSpPr>
+        <p:cNvPr id="1" name=""/>
+        <p:cNvGrpSpPr/>
+        <p:nvPr/>
+      </p:nvGrpSpPr>
+      <p:grpSpPr>
+        <a:xfrm>
+          <a:off x="0" y="0"/>
+          <a:ext cx="0" cy="0"/>
+          <a:chOff x="0" y="0"/>
+          <a:chExt cx="0" cy="0"/>
+        </a:xfrm>
+      </p:grpSpPr>
+      <p:sp>
+        <p:nvSpPr>
+          <p:cNvPr id="2" name="Content Placeholder 1"/>
+          <p:cNvSpPr>
+            <a:spLocks noGrp="1"/>
+          </p:cNvSpPr>
+          <p:nvPr>
+            <p:ph idx="1"/>
+          </p:nvPr>
+        </p:nvSpPr>
+        <p:spPr>
+          <a:xfrm>
+            <a:off x="262743" y="437976"/>
+            <a:ext cx="1707829" cy="4554967"/>
+          </a:xfrm>
+        </p:spPr>
+        <p:txBody>
+          <a:bodyPr>
+            <a:normAutofit/>
+          </a:bodyPr>
+          <a:lstStyle/>
+          <a:p>
+            <a:pPr marL="0" indent="0">
+              <a:buNone/>
+            </a:pPr>
+            <a:r>
+              <a:rPr lang="en-US" sz="1400" dirty="0" smtClean="0"/>
+              <a:t>Persona</a:t>
+            </a:r>
+            <a:endParaRPr lang="en-US" sz="1400" dirty="0" smtClean="0"/>
+          </a:p>
+          <a:p>
+            <a:pPr marL="0" indent="0">
+              <a:buNone/>
+            </a:pPr>
+            <a:r>
+              <a:rPr lang="en-US" sz="1800" dirty="0" smtClean="0">
+                <a:latin typeface="Lato Black"/>
+                <a:cs typeface="Lato Black"/>
+              </a:rPr>
+              <a:t>Submitter</a:t>
+            </a:r>
+          </a:p>
+          <a:p>
+            <a:pPr marL="0" indent="0">
+              <a:buNone/>
+            </a:pPr>
+            <a:endParaRPr lang="en-US" sz="1400" dirty="0" smtClean="0"/>
+          </a:p>
+          <a:p>
+            <a:pPr marL="0" indent="0">
+              <a:buNone/>
+            </a:pPr>
+            <a:r>
+              <a:rPr lang="en-US" sz="1400" dirty="0" smtClean="0"/>
+              <a:t>Primary Goals</a:t>
+            </a:r>
+            <a:endParaRPr lang="en-US" sz="1400" dirty="0" smtClean="0"/>
+          </a:p>
+          <a:p>
+            <a:pPr marL="0" indent="0">
+              <a:buNone/>
+            </a:pPr>
+            <a:r>
+              <a:rPr lang="en-US" sz="1800" dirty="0" smtClean="0">
+                <a:latin typeface="Lato Black"/>
+                <a:cs typeface="Lato Black"/>
+              </a:rPr>
+              <a:t>Views submitted ideas</a:t>
+            </a:r>
+          </a:p>
+          <a:p>
+            <a:pPr marL="0" indent="0">
+              <a:buNone/>
+            </a:pPr>
+            <a:r>
+              <a:rPr lang="en-US" sz="1800" dirty="0">
+                <a:latin typeface="Lato Black"/>
+                <a:cs typeface="Lato Black"/>
+              </a:rPr>
+              <a:t>C</a:t>
+            </a:r>
+            <a:r>
+              <a:rPr lang="en-US" sz="1800" dirty="0" smtClean="0">
+                <a:latin typeface="Lato Black"/>
+                <a:cs typeface="Lato Black"/>
+              </a:rPr>
+              <a:t>omments </a:t>
+            </a:r>
+            <a:r>
+              <a:rPr lang="en-US" sz="1800" dirty="0">
+                <a:latin typeface="Lato Black"/>
+                <a:cs typeface="Lato Black"/>
+              </a:rPr>
+              <a:t>on </a:t>
+            </a:r>
+            <a:r>
+              <a:rPr lang="en-US" sz="1800" dirty="0" smtClean="0">
+                <a:latin typeface="Lato Black"/>
+                <a:cs typeface="Lato Black"/>
+              </a:rPr>
+              <a:t>ideas</a:t>
+            </a:r>
+          </a:p>
+          <a:p>
+            <a:pPr marL="0" indent="0">
+              <a:buNone/>
+            </a:pPr>
+            <a:r>
+              <a:rPr lang="en-US" sz="1800" dirty="0" smtClean="0">
+                <a:latin typeface="Lato Black"/>
+                <a:cs typeface="Lato Black"/>
+              </a:rPr>
+              <a:t>Votes on ideas</a:t>
+            </a:r>
+          </a:p>
+          <a:p>
+            <a:pPr marL="0" indent="0">
+              <a:buNone/>
+            </a:pPr>
+            <a:r>
+              <a:rPr lang="en-US" sz="1800" dirty="0">
+                <a:latin typeface="Lato Black"/>
+                <a:cs typeface="Lato Black"/>
+              </a:rPr>
+              <a:t>S</a:t>
+            </a:r>
+            <a:r>
+              <a:rPr lang="en-US" sz="1800" dirty="0" smtClean="0">
+                <a:latin typeface="Lato Black"/>
+                <a:cs typeface="Lato Black"/>
+              </a:rPr>
+              <a:t>ubmits ideas</a:t>
+            </a:r>
+          </a:p>
+          <a:p>
+            <a:pPr marL="0" indent="0">
+              <a:buNone/>
+            </a:pPr>
+            <a:endParaRPr lang="en-US" sz="1400" dirty="0">
+              <a:latin typeface="Lato Black"/>
+              <a:cs typeface="Lato Black"/>
+            </a:endParaRPr>
+          </a:p>
+          <a:p>
+            <a:pPr marL="0" indent="0">
+              <a:buNone/>
+            </a:pPr>
+            <a:r>
+              <a:rPr lang="en-US" sz="1400" dirty="0" smtClean="0"/>
+              <a:t>Confidence</a:t>
+            </a:r>
+            <a:endParaRPr lang="en-US" sz="1400" dirty="0"/>
+          </a:p>
+          <a:p>
+            <a:pPr marL="0" indent="0">
+              <a:buNone/>
+            </a:pPr>
+            <a:r>
+              <a:rPr lang="en-US" sz="1800" dirty="0" smtClean="0">
+                <a:latin typeface="Lato Black"/>
+                <a:cs typeface="Lato Black"/>
+              </a:rPr>
+              <a:t>Low</a:t>
+            </a:r>
+            <a:endParaRPr lang="en-US" sz="1800" dirty="0">
+              <a:latin typeface="Lato Black"/>
+              <a:cs typeface="Lato Black"/>
+            </a:endParaRPr>
+          </a:p>
+          <a:p>
+            <a:pPr marL="0" indent="0">
+              <a:buNone/>
+            </a:pPr>
+            <a:endParaRPr lang="en-US" sz="1400" dirty="0" smtClean="0">
+              <a:latin typeface="Lato Black"/>
+              <a:cs typeface="Lato Black"/>
+            </a:endParaRPr>
+          </a:p>
+          <a:p>
+            <a:pPr marL="0" indent="0">
+              <a:buNone/>
+            </a:pPr>
+            <a:endParaRPr lang="en-US" sz="1400" dirty="0"/>
+          </a:p>
+        </p:txBody>
+      </p:sp>
+      <p:sp>
+        <p:nvSpPr>
+          <p:cNvPr id="3" name="Content Placeholder 1"/>
+          <p:cNvSpPr txBox="1">
+            <a:spLocks/>
+          </p:cNvSpPr>
+          <p:nvPr/>
+        </p:nvSpPr>
+        <p:spPr>
+          <a:xfrm>
+            <a:off x="4574560" y="874514"/>
+            <a:ext cx="4117360" cy="3394472"/>
+          </a:xfrm>
+          <a:prstGeom prst="rect">
+            <a:avLst/>
+          </a:prstGeom>
+        </p:spPr>
+        <p:txBody>
+          <a:bodyPr vert="horz" lIns="91440" tIns="45720" rIns="91440" bIns="45720" rtlCol="0">
+            <a:normAutofit/>
+          </a:bodyPr>
+          <a:lstStyle>
+            <a:lvl1pPr marL="342900" indent="-342900" algn="l" defTabSz="457200" rtl="0" eaLnBrk="1" latinLnBrk="0" hangingPunct="1">
+              <a:spcBef>
+                <a:spcPct val="20000"/>
+              </a:spcBef>
+              <a:buFont typeface="Arial"/>
+              <a:buChar char="•"/>
+              <a:defRPr sz="3200" kern="1200">
+                <a:solidFill>
+                  <a:schemeClr val="bg1"/>
+                </a:solidFill>
+                <a:latin typeface="Lato Light"/>
+                <a:ea typeface="+mn-ea"/>
+                <a:cs typeface="Lato Light"/>
+              </a:defRPr>
+            </a:lvl1pPr>
+            <a:lvl2pPr marL="742950" indent="-285750" algn="l" defTabSz="457200" rtl="0" eaLnBrk="1" latinLnBrk="0" hangingPunct="1">
+              <a:spcBef>
+                <a:spcPct val="20000"/>
+              </a:spcBef>
+              <a:buFont typeface="Arial"/>
+              <a:buChar char="–"/>
+              <a:defRPr sz="2800" kern="1200">
+                <a:solidFill>
+                  <a:schemeClr val="bg1"/>
+                </a:solidFill>
+                <a:latin typeface="Lato Light"/>
+                <a:ea typeface="+mn-ea"/>
+                <a:cs typeface="Lato Light"/>
+              </a:defRPr>
+            </a:lvl2pPr>
+            <a:lvl3pPr marL="1143000" indent="-228600" algn="l" defTabSz="457200" rtl="0" eaLnBrk="1" latinLnBrk="0" hangingPunct="1">
+              <a:spcBef>
+                <a:spcPct val="20000"/>
+              </a:spcBef>
+              <a:buFont typeface="Arial"/>
+              <a:buChar char="•"/>
+              <a:defRPr sz="2400" kern="1200">
+                <a:solidFill>
+                  <a:schemeClr val="bg1"/>
+                </a:solidFill>
+                <a:latin typeface="Lato Light"/>
+                <a:ea typeface="+mn-ea"/>
+                <a:cs typeface="Lato Light"/>
+              </a:defRPr>
+            </a:lvl3pPr>
+            <a:lvl4pPr marL="1600200" indent="-228600" algn="l" defTabSz="457200" rtl="0" eaLnBrk="1" latinLnBrk="0" hangingPunct="1">
+              <a:spcBef>
+                <a:spcPct val="20000"/>
+              </a:spcBef>
+              <a:buFont typeface="Arial"/>
+              <a:buChar char="–"/>
+              <a:defRPr sz="2000" kern="1200">
+                <a:solidFill>
+                  <a:schemeClr val="bg1"/>
+                </a:solidFill>
+                <a:latin typeface="Lato Light"/>
+                <a:ea typeface="+mn-ea"/>
+                <a:cs typeface="Lato Light"/>
+              </a:defRPr>
+            </a:lvl4pPr>
+            <a:lvl5pPr marL="2057400" indent="-228600" algn="l" defTabSz="457200" rtl="0" eaLnBrk="1" latinLnBrk="0" hangingPunct="1">
+              <a:spcBef>
+                <a:spcPct val="20000"/>
+              </a:spcBef>
+              <a:buFont typeface="Arial"/>
+              <a:buChar char="»"/>
+              <a:defRPr sz="2000" kern="1200">
+                <a:solidFill>
+                  <a:schemeClr val="bg1"/>
+                </a:solidFill>
+                <a:latin typeface="Lato Light"/>
+                <a:ea typeface="+mn-ea"/>
+                <a:cs typeface="Lato Light"/>
+              </a:defRPr>
+            </a:lvl5pPr>
+            <a:lvl6pPr marL="2514600" indent="-228600" algn="l" defTabSz="457200" rtl="0" eaLnBrk="1" latinLnBrk="0" hangingPunct="1">
+              <a:spcBef>
+                <a:spcPct val="20000"/>
+              </a:spcBef>
+              <a:buFont typeface="Arial"/>
+              <a:buChar char="•"/>
+              <a:defRPr sz="2000" kern="1200">
+                <a:solidFill>
+                  <a:schemeClr val="tx1"/>
+                </a:solidFill>
+                <a:latin typeface="+mn-lt"/>
+                <a:ea typeface="+mn-ea"/>
+                <a:cs typeface="+mn-cs"/>
+              </a:defRPr>
+            </a:lvl6pPr>
+            <a:lvl7pPr marL="2971800" indent="-228600" algn="l" defTabSz="457200" rtl="0" eaLnBrk="1" latinLnBrk="0" hangingPunct="1">
+              <a:spcBef>
+                <a:spcPct val="20000"/>
+              </a:spcBef>
+              <a:buFont typeface="Arial"/>
+              <a:buChar char="•"/>
+              <a:defRPr sz="2000" kern="1200">
+                <a:solidFill>
+                  <a:schemeClr val="tx1"/>
+                </a:solidFill>
+                <a:latin typeface="+mn-lt"/>
+                <a:ea typeface="+mn-ea"/>
+                <a:cs typeface="+mn-cs"/>
+              </a:defRPr>
+            </a:lvl7pPr>
+            <a:lvl8pPr marL="3429000" indent="-228600" algn="l" defTabSz="457200" rtl="0" eaLnBrk="1" latinLnBrk="0" hangingPunct="1">
+              <a:spcBef>
+                <a:spcPct val="20000"/>
+              </a:spcBef>
+              <a:buFont typeface="Arial"/>
+              <a:buChar char="•"/>
+              <a:defRPr sz="2000" kern="1200">
+                <a:solidFill>
+                  <a:schemeClr val="tx1"/>
+                </a:solidFill>
+                <a:latin typeface="+mn-lt"/>
+                <a:ea typeface="+mn-ea"/>
+                <a:cs typeface="+mn-cs"/>
+              </a:defRPr>
+            </a:lvl8pPr>
+            <a:lvl9pPr marL="3886200" indent="-228600" algn="l" defTabSz="457200" rtl="0" eaLnBrk="1" latinLnBrk="0" hangingPunct="1">
+              <a:spcBef>
+                <a:spcPct val="20000"/>
+              </a:spcBef>
+              <a:buFont typeface="Arial"/>
+              <a:buChar char="•"/>
+              <a:defRPr sz="2000" kern="1200">
+                <a:solidFill>
+                  <a:schemeClr val="tx1"/>
+                </a:solidFill>
+                <a:latin typeface="+mn-lt"/>
+                <a:ea typeface="+mn-ea"/>
+                <a:cs typeface="+mn-cs"/>
+              </a:defRPr>
+            </a:lvl9pPr>
+          </a:lstStyle>
+          <a:p>
+            <a:endParaRPr lang="en-US" dirty="0"/>
+          </a:p>
+        </p:txBody>
+      </p:sp>
+      <p:sp>
+        <p:nvSpPr>
+          <p:cNvPr id="4" name="Content Placeholder 1"/>
+          <p:cNvSpPr txBox="1">
+            <a:spLocks/>
+          </p:cNvSpPr>
+          <p:nvPr/>
+        </p:nvSpPr>
+        <p:spPr>
+          <a:xfrm>
+            <a:off x="4574560" y="881820"/>
+            <a:ext cx="4117360" cy="3394472"/>
+          </a:xfrm>
+          <a:prstGeom prst="rect">
+            <a:avLst/>
+          </a:prstGeom>
+        </p:spPr>
+        <p:txBody>
+          <a:bodyPr vert="horz" lIns="91440" tIns="45720" rIns="91440" bIns="45720" rtlCol="0">
+            <a:normAutofit/>
+          </a:bodyPr>
+          <a:lstStyle>
+            <a:lvl1pPr marL="342900" indent="-342900" algn="l" defTabSz="457200" rtl="0" eaLnBrk="1" latinLnBrk="0" hangingPunct="1">
+              <a:spcBef>
+                <a:spcPct val="20000"/>
+              </a:spcBef>
+              <a:buFont typeface="Arial"/>
+              <a:buChar char="•"/>
+              <a:defRPr sz="3200" kern="1200">
+                <a:solidFill>
+                  <a:schemeClr val="bg1"/>
+                </a:solidFill>
+                <a:latin typeface="Lato Light"/>
+                <a:ea typeface="+mn-ea"/>
+                <a:cs typeface="Lato Light"/>
+              </a:defRPr>
+            </a:lvl1pPr>
+            <a:lvl2pPr marL="742950" indent="-285750" algn="l" defTabSz="457200" rtl="0" eaLnBrk="1" latinLnBrk="0" hangingPunct="1">
+              <a:spcBef>
+                <a:spcPct val="20000"/>
+              </a:spcBef>
+              <a:buFont typeface="Arial"/>
+              <a:buChar char="–"/>
+              <a:defRPr sz="2800" kern="1200">
+                <a:solidFill>
+                  <a:schemeClr val="bg1"/>
+                </a:solidFill>
+                <a:latin typeface="Lato Light"/>
+                <a:ea typeface="+mn-ea"/>
+                <a:cs typeface="Lato Light"/>
+              </a:defRPr>
+            </a:lvl2pPr>
+            <a:lvl3pPr marL="1143000" indent="-228600" algn="l" defTabSz="457200" rtl="0" eaLnBrk="1" latinLnBrk="0" hangingPunct="1">
+              <a:spcBef>
+                <a:spcPct val="20000"/>
+              </a:spcBef>
+              <a:buFont typeface="Arial"/>
+              <a:buChar char="•"/>
+              <a:defRPr sz="2400" kern="1200">
+                <a:solidFill>
+                  <a:schemeClr val="bg1"/>
+                </a:solidFill>
+                <a:latin typeface="Lato Light"/>
+                <a:ea typeface="+mn-ea"/>
+                <a:cs typeface="Lato Light"/>
+              </a:defRPr>
+            </a:lvl3pPr>
+            <a:lvl4pPr marL="1600200" indent="-228600" algn="l" defTabSz="457200" rtl="0" eaLnBrk="1" latinLnBrk="0" hangingPunct="1">
+              <a:spcBef>
+                <a:spcPct val="20000"/>
+              </a:spcBef>
+              <a:buFont typeface="Arial"/>
+              <a:buChar char="–"/>
+              <a:defRPr sz="2000" kern="1200">
+                <a:solidFill>
+                  <a:schemeClr val="bg1"/>
+                </a:solidFill>
+                <a:latin typeface="Lato Light"/>
+                <a:ea typeface="+mn-ea"/>
+                <a:cs typeface="Lato Light"/>
+              </a:defRPr>
+            </a:lvl4pPr>
+            <a:lvl5pPr marL="2057400" indent="-228600" algn="l" defTabSz="457200" rtl="0" eaLnBrk="1" latinLnBrk="0" hangingPunct="1">
+              <a:spcBef>
+                <a:spcPct val="20000"/>
+              </a:spcBef>
+              <a:buFont typeface="Arial"/>
+              <a:buChar char="»"/>
+              <a:defRPr sz="2000" kern="1200">
+                <a:solidFill>
+                  <a:schemeClr val="bg1"/>
+                </a:solidFill>
+                <a:latin typeface="Lato Light"/>
+                <a:ea typeface="+mn-ea"/>
+                <a:cs typeface="Lato Light"/>
+              </a:defRPr>
+            </a:lvl5pPr>
+            <a:lvl6pPr marL="2514600" indent="-228600" algn="l" defTabSz="457200" rtl="0" eaLnBrk="1" latinLnBrk="0" hangingPunct="1">
+              <a:spcBef>
+                <a:spcPct val="20000"/>
+              </a:spcBef>
+              <a:buFont typeface="Arial"/>
+              <a:buChar char="•"/>
+              <a:defRPr sz="2000" kern="1200">
+                <a:solidFill>
+                  <a:schemeClr val="tx1"/>
+                </a:solidFill>
+                <a:latin typeface="+mn-lt"/>
+                <a:ea typeface="+mn-ea"/>
+                <a:cs typeface="+mn-cs"/>
+              </a:defRPr>
+            </a:lvl6pPr>
+            <a:lvl7pPr marL="2971800" indent="-228600" algn="l" defTabSz="457200" rtl="0" eaLnBrk="1" latinLnBrk="0" hangingPunct="1">
+              <a:spcBef>
+                <a:spcPct val="20000"/>
+              </a:spcBef>
+              <a:buFont typeface="Arial"/>
+              <a:buChar char="•"/>
+              <a:defRPr sz="2000" kern="1200">
+                <a:solidFill>
+                  <a:schemeClr val="tx1"/>
+                </a:solidFill>
+                <a:latin typeface="+mn-lt"/>
+                <a:ea typeface="+mn-ea"/>
+                <a:cs typeface="+mn-cs"/>
+              </a:defRPr>
+            </a:lvl7pPr>
+            <a:lvl8pPr marL="3429000" indent="-228600" algn="l" defTabSz="457200" rtl="0" eaLnBrk="1" latinLnBrk="0" hangingPunct="1">
+              <a:spcBef>
+                <a:spcPct val="20000"/>
+              </a:spcBef>
+              <a:buFont typeface="Arial"/>
+              <a:buChar char="•"/>
+              <a:defRPr sz="2000" kern="1200">
+                <a:solidFill>
+                  <a:schemeClr val="tx1"/>
+                </a:solidFill>
+                <a:latin typeface="+mn-lt"/>
+                <a:ea typeface="+mn-ea"/>
+                <a:cs typeface="+mn-cs"/>
+              </a:defRPr>
+            </a:lvl8pPr>
+            <a:lvl9pPr marL="3886200" indent="-228600" algn="l" defTabSz="457200" rtl="0" eaLnBrk="1" latinLnBrk="0" hangingPunct="1">
+              <a:spcBef>
+                <a:spcPct val="20000"/>
+              </a:spcBef>
+              <a:buFont typeface="Arial"/>
+              <a:buChar char="•"/>
+              <a:defRPr sz="2000" kern="1200">
+                <a:solidFill>
+                  <a:schemeClr val="tx1"/>
+                </a:solidFill>
+                <a:latin typeface="+mn-lt"/>
+                <a:ea typeface="+mn-ea"/>
+                <a:cs typeface="+mn-cs"/>
+              </a:defRPr>
+            </a:lvl9pPr>
+          </a:lstStyle>
+          <a:p>
+            <a:endParaRPr lang="en-US" dirty="0"/>
+          </a:p>
+        </p:txBody>
+      </p:sp>
+      <p:sp>
+        <p:nvSpPr>
+          <p:cNvPr id="12" name="Content Placeholder 1"/>
+          <p:cNvSpPr txBox="1">
+            <a:spLocks/>
+          </p:cNvSpPr>
+          <p:nvPr/>
+        </p:nvSpPr>
+        <p:spPr>
+          <a:xfrm>
+            <a:off x="1945940" y="437977"/>
+            <a:ext cx="1707829" cy="4554966"/>
+          </a:xfrm>
+          <a:prstGeom prst="rect">
+            <a:avLst/>
+          </a:prstGeom>
+        </p:spPr>
+        <p:txBody>
+          <a:bodyPr vert="horz" lIns="91440" tIns="45720" rIns="91440" bIns="45720" rtlCol="0">
+            <a:normAutofit/>
+          </a:bodyPr>
+          <a:lstStyle>
+            <a:lvl1pPr marL="342900" indent="-342900" algn="l" defTabSz="457200" rtl="0" eaLnBrk="1" latinLnBrk="0" hangingPunct="1">
+              <a:spcBef>
+                <a:spcPct val="20000"/>
+              </a:spcBef>
+              <a:buFont typeface="Arial"/>
+              <a:buChar char="•"/>
+              <a:defRPr sz="3200" kern="1200">
+                <a:solidFill>
+                  <a:schemeClr val="bg1"/>
+                </a:solidFill>
+                <a:latin typeface="Lato Light"/>
+                <a:ea typeface="+mn-ea"/>
+                <a:cs typeface="Lato Light"/>
+              </a:defRPr>
+            </a:lvl1pPr>
+            <a:lvl2pPr marL="742950" indent="-285750" algn="l" defTabSz="457200" rtl="0" eaLnBrk="1" latinLnBrk="0" hangingPunct="1">
+              <a:spcBef>
+                <a:spcPct val="20000"/>
+              </a:spcBef>
+              <a:buFont typeface="Arial"/>
+              <a:buChar char="–"/>
+              <a:defRPr sz="2800" kern="1200">
+                <a:solidFill>
+                  <a:schemeClr val="bg1"/>
+                </a:solidFill>
+                <a:latin typeface="Lato Light"/>
+                <a:ea typeface="+mn-ea"/>
+                <a:cs typeface="Lato Light"/>
+              </a:defRPr>
+            </a:lvl2pPr>
+            <a:lvl3pPr marL="1143000" indent="-228600" algn="l" defTabSz="457200" rtl="0" eaLnBrk="1" latinLnBrk="0" hangingPunct="1">
+              <a:spcBef>
+                <a:spcPct val="20000"/>
+              </a:spcBef>
+              <a:buFont typeface="Arial"/>
+              <a:buChar char="•"/>
+              <a:defRPr sz="2400" kern="1200">
+                <a:solidFill>
+                  <a:schemeClr val="bg1"/>
+                </a:solidFill>
+                <a:latin typeface="Lato Light"/>
+                <a:ea typeface="+mn-ea"/>
+                <a:cs typeface="Lato Light"/>
+              </a:defRPr>
+            </a:lvl3pPr>
+            <a:lvl4pPr marL="1600200" indent="-228600" algn="l" defTabSz="457200" rtl="0" eaLnBrk="1" latinLnBrk="0" hangingPunct="1">
+              <a:spcBef>
+                <a:spcPct val="20000"/>
+              </a:spcBef>
+              <a:buFont typeface="Arial"/>
+              <a:buChar char="–"/>
+              <a:defRPr sz="2000" kern="1200">
+                <a:solidFill>
+                  <a:schemeClr val="bg1"/>
+                </a:solidFill>
+                <a:latin typeface="Lato Light"/>
+                <a:ea typeface="+mn-ea"/>
+                <a:cs typeface="Lato Light"/>
+              </a:defRPr>
+            </a:lvl4pPr>
+            <a:lvl5pPr marL="2057400" indent="-228600" algn="l" defTabSz="457200" rtl="0" eaLnBrk="1" latinLnBrk="0" hangingPunct="1">
+              <a:spcBef>
+                <a:spcPct val="20000"/>
+              </a:spcBef>
+              <a:buFont typeface="Arial"/>
+              <a:buChar char="»"/>
+              <a:defRPr sz="2000" kern="1200">
+                <a:solidFill>
+                  <a:schemeClr val="bg1"/>
+                </a:solidFill>
+                <a:latin typeface="Lato Light"/>
+                <a:ea typeface="+mn-ea"/>
+                <a:cs typeface="Lato Light"/>
+              </a:defRPr>
+            </a:lvl5pPr>
+            <a:lvl6pPr marL="2514600" indent="-228600" algn="l" defTabSz="457200" rtl="0" eaLnBrk="1" latinLnBrk="0" hangingPunct="1">
+              <a:spcBef>
+                <a:spcPct val="20000"/>
+              </a:spcBef>
+              <a:buFont typeface="Arial"/>
+              <a:buChar char="•"/>
+              <a:defRPr sz="2000" kern="1200">
+                <a:solidFill>
+                  <a:schemeClr val="tx1"/>
+                </a:solidFill>
+                <a:latin typeface="+mn-lt"/>
+                <a:ea typeface="+mn-ea"/>
+                <a:cs typeface="+mn-cs"/>
+              </a:defRPr>
+            </a:lvl6pPr>
+            <a:lvl7pPr marL="2971800" indent="-228600" algn="l" defTabSz="457200" rtl="0" eaLnBrk="1" latinLnBrk="0" hangingPunct="1">
+              <a:spcBef>
+                <a:spcPct val="20000"/>
+              </a:spcBef>
+              <a:buFont typeface="Arial"/>
+              <a:buChar char="•"/>
+              <a:defRPr sz="2000" kern="1200">
+                <a:solidFill>
+                  <a:schemeClr val="tx1"/>
+                </a:solidFill>
+                <a:latin typeface="+mn-lt"/>
+                <a:ea typeface="+mn-ea"/>
+                <a:cs typeface="+mn-cs"/>
+              </a:defRPr>
+            </a:lvl7pPr>
+            <a:lvl8pPr marL="3429000" indent="-228600" algn="l" defTabSz="457200" rtl="0" eaLnBrk="1" latinLnBrk="0" hangingPunct="1">
+              <a:spcBef>
+                <a:spcPct val="20000"/>
+              </a:spcBef>
+              <a:buFont typeface="Arial"/>
+              <a:buChar char="•"/>
+              <a:defRPr sz="2000" kern="1200">
+                <a:solidFill>
+                  <a:schemeClr val="tx1"/>
+                </a:solidFill>
+                <a:latin typeface="+mn-lt"/>
+                <a:ea typeface="+mn-ea"/>
+                <a:cs typeface="+mn-cs"/>
+              </a:defRPr>
+            </a:lvl8pPr>
+            <a:lvl9pPr marL="3886200" indent="-228600" algn="l" defTabSz="457200" rtl="0" eaLnBrk="1" latinLnBrk="0" hangingPunct="1">
+              <a:spcBef>
+                <a:spcPct val="20000"/>
+              </a:spcBef>
+              <a:buFont typeface="Arial"/>
+              <a:buChar char="•"/>
+              <a:defRPr sz="2000" kern="1200">
+                <a:solidFill>
+                  <a:schemeClr val="tx1"/>
+                </a:solidFill>
+                <a:latin typeface="+mn-lt"/>
+                <a:ea typeface="+mn-ea"/>
+                <a:cs typeface="+mn-cs"/>
+              </a:defRPr>
+            </a:lvl9pPr>
+          </a:lstStyle>
+          <a:p>
+            <a:pPr marL="0" indent="0">
+              <a:buFont typeface="Arial"/>
+              <a:buNone/>
+            </a:pPr>
+            <a:r>
+              <a:rPr lang="en-US" sz="1400" dirty="0" smtClean="0"/>
+              <a:t>Persona</a:t>
+            </a:r>
+          </a:p>
+          <a:p>
+            <a:pPr marL="0" indent="0">
+              <a:buFont typeface="Arial"/>
+              <a:buNone/>
+            </a:pPr>
+            <a:r>
+              <a:rPr lang="en-US" sz="1800" dirty="0" smtClean="0">
+                <a:latin typeface="Lato Black"/>
+                <a:cs typeface="Lato Black"/>
+              </a:rPr>
+              <a:t>Reviewer</a:t>
+            </a:r>
+          </a:p>
+          <a:p>
+            <a:pPr marL="0" indent="0">
+              <a:buFont typeface="Arial"/>
+              <a:buNone/>
+            </a:pPr>
+            <a:endParaRPr lang="en-US" sz="1400" dirty="0" smtClean="0"/>
+          </a:p>
+          <a:p>
+            <a:pPr marL="0" indent="0">
+              <a:buFont typeface="Arial"/>
+              <a:buNone/>
+            </a:pPr>
+            <a:r>
+              <a:rPr lang="en-US" sz="1400" dirty="0" smtClean="0"/>
+              <a:t>Primary Goals</a:t>
+            </a:r>
+          </a:p>
+          <a:p>
+            <a:pPr marL="0" indent="0">
+              <a:buFont typeface="Arial"/>
+              <a:buNone/>
+            </a:pPr>
+            <a:r>
+              <a:rPr lang="en-US" sz="1800" dirty="0" smtClean="0">
+                <a:latin typeface="Lato Black"/>
+                <a:cs typeface="Lato Black"/>
+              </a:rPr>
+              <a:t>Reviews submitted ideas</a:t>
+            </a:r>
+          </a:p>
+          <a:p>
+            <a:pPr marL="0" indent="0">
+              <a:buFont typeface="Arial"/>
+              <a:buNone/>
+            </a:pPr>
+            <a:endParaRPr lang="en-US" sz="1400" dirty="0" smtClean="0">
+              <a:latin typeface="Lato Black"/>
+              <a:cs typeface="Lato Black"/>
+            </a:endParaRPr>
+          </a:p>
+          <a:p>
+            <a:pPr marL="0" indent="0">
+              <a:buNone/>
+            </a:pPr>
+            <a:r>
+              <a:rPr lang="en-US" sz="1400" dirty="0" smtClean="0"/>
+              <a:t>Secondary Goals</a:t>
+            </a:r>
+            <a:endParaRPr lang="en-US" sz="1400" dirty="0"/>
+          </a:p>
+          <a:p>
+            <a:pPr marL="0" indent="0">
+              <a:buNone/>
+            </a:pPr>
+            <a:r>
+              <a:rPr lang="en-US" sz="1800" dirty="0" smtClean="0">
+                <a:latin typeface="Lato Black"/>
+                <a:cs typeface="Lato Black"/>
+              </a:rPr>
+              <a:t>Submitter Persona</a:t>
+            </a:r>
+          </a:p>
+          <a:p>
+            <a:pPr marL="0" indent="0">
+              <a:buNone/>
+            </a:pPr>
+            <a:endParaRPr lang="en-US" sz="900" dirty="0" smtClean="0">
+              <a:latin typeface="Lato Black"/>
+              <a:cs typeface="Lato Black"/>
+            </a:endParaRPr>
+          </a:p>
+          <a:p>
+            <a:pPr marL="0" indent="0">
+              <a:buNone/>
+            </a:pPr>
+            <a:endParaRPr lang="en-US" sz="1200" dirty="0">
+              <a:latin typeface="Lato Black"/>
+              <a:cs typeface="Lato Black"/>
+            </a:endParaRPr>
+          </a:p>
+          <a:p>
+            <a:pPr marL="0" indent="0">
+              <a:buNone/>
+            </a:pPr>
+            <a:r>
+              <a:rPr lang="en-US" sz="1400" dirty="0"/>
+              <a:t>Confidence</a:t>
+            </a:r>
+          </a:p>
+          <a:p>
+            <a:pPr marL="0" indent="0">
+              <a:buNone/>
+            </a:pPr>
+            <a:r>
+              <a:rPr lang="en-US" sz="1800" dirty="0">
+                <a:latin typeface="Lato Black"/>
+                <a:cs typeface="Lato Black"/>
+              </a:rPr>
+              <a:t>Low</a:t>
+            </a:r>
+          </a:p>
+          <a:p>
+            <a:pPr marL="0" indent="0">
+              <a:buNone/>
+            </a:pPr>
+            <a:endParaRPr lang="en-US" sz="1400" dirty="0">
+              <a:latin typeface="Lato Black"/>
+              <a:cs typeface="Lato Black"/>
+            </a:endParaRPr>
+          </a:p>
+          <a:p>
+            <a:pPr marL="0" indent="0">
+              <a:buFont typeface="Arial"/>
+              <a:buNone/>
+            </a:pPr>
+            <a:endParaRPr lang="en-US" sz="1400" dirty="0" smtClean="0">
+              <a:latin typeface="Lato Black"/>
+              <a:cs typeface="Lato Black"/>
+            </a:endParaRPr>
+          </a:p>
+        </p:txBody>
+      </p:sp>
+      <p:sp>
+        <p:nvSpPr>
+          <p:cNvPr id="13" name="Content Placeholder 1"/>
+          <p:cNvSpPr txBox="1">
+            <a:spLocks/>
+          </p:cNvSpPr>
+          <p:nvPr/>
+        </p:nvSpPr>
+        <p:spPr>
+          <a:xfrm>
+            <a:off x="3629137" y="437976"/>
+            <a:ext cx="1806357" cy="4554967"/>
+          </a:xfrm>
+          <a:prstGeom prst="rect">
+            <a:avLst/>
+          </a:prstGeom>
+        </p:spPr>
+        <p:txBody>
+          <a:bodyPr vert="horz" lIns="91440" tIns="45720" rIns="91440" bIns="45720" rtlCol="0">
+            <a:normAutofit/>
+          </a:bodyPr>
+          <a:lstStyle>
+            <a:lvl1pPr marL="342900" indent="-342900" algn="l" defTabSz="457200" rtl="0" eaLnBrk="1" latinLnBrk="0" hangingPunct="1">
+              <a:spcBef>
+                <a:spcPct val="20000"/>
+              </a:spcBef>
+              <a:buFont typeface="Arial"/>
+              <a:buChar char="•"/>
+              <a:defRPr sz="3200" kern="1200">
+                <a:solidFill>
+                  <a:schemeClr val="bg1"/>
+                </a:solidFill>
+                <a:latin typeface="Lato Light"/>
+                <a:ea typeface="+mn-ea"/>
+                <a:cs typeface="Lato Light"/>
+              </a:defRPr>
+            </a:lvl1pPr>
+            <a:lvl2pPr marL="742950" indent="-285750" algn="l" defTabSz="457200" rtl="0" eaLnBrk="1" latinLnBrk="0" hangingPunct="1">
+              <a:spcBef>
+                <a:spcPct val="20000"/>
+              </a:spcBef>
+              <a:buFont typeface="Arial"/>
+              <a:buChar char="–"/>
+              <a:defRPr sz="2800" kern="1200">
+                <a:solidFill>
+                  <a:schemeClr val="bg1"/>
+                </a:solidFill>
+                <a:latin typeface="Lato Light"/>
+                <a:ea typeface="+mn-ea"/>
+                <a:cs typeface="Lato Light"/>
+              </a:defRPr>
+            </a:lvl2pPr>
+            <a:lvl3pPr marL="1143000" indent="-228600" algn="l" defTabSz="457200" rtl="0" eaLnBrk="1" latinLnBrk="0" hangingPunct="1">
+              <a:spcBef>
+                <a:spcPct val="20000"/>
+              </a:spcBef>
+              <a:buFont typeface="Arial"/>
+              <a:buChar char="•"/>
+              <a:defRPr sz="2400" kern="1200">
+                <a:solidFill>
+                  <a:schemeClr val="bg1"/>
+                </a:solidFill>
+                <a:latin typeface="Lato Light"/>
+                <a:ea typeface="+mn-ea"/>
+                <a:cs typeface="Lato Light"/>
+              </a:defRPr>
+            </a:lvl3pPr>
+            <a:lvl4pPr marL="1600200" indent="-228600" algn="l" defTabSz="457200" rtl="0" eaLnBrk="1" latinLnBrk="0" hangingPunct="1">
+              <a:spcBef>
+                <a:spcPct val="20000"/>
+              </a:spcBef>
+              <a:buFont typeface="Arial"/>
+              <a:buChar char="–"/>
+              <a:defRPr sz="2000" kern="1200">
+                <a:solidFill>
+                  <a:schemeClr val="bg1"/>
+                </a:solidFill>
+                <a:latin typeface="Lato Light"/>
+                <a:ea typeface="+mn-ea"/>
+                <a:cs typeface="Lato Light"/>
+              </a:defRPr>
+            </a:lvl4pPr>
+            <a:lvl5pPr marL="2057400" indent="-228600" algn="l" defTabSz="457200" rtl="0" eaLnBrk="1" latinLnBrk="0" hangingPunct="1">
+              <a:spcBef>
+                <a:spcPct val="20000"/>
+              </a:spcBef>
+              <a:buFont typeface="Arial"/>
+              <a:buChar char="»"/>
+              <a:defRPr sz="2000" kern="1200">
+                <a:solidFill>
+                  <a:schemeClr val="bg1"/>
+                </a:solidFill>
+                <a:latin typeface="Lato Light"/>
+                <a:ea typeface="+mn-ea"/>
+                <a:cs typeface="Lato Light"/>
+              </a:defRPr>
+            </a:lvl5pPr>
+            <a:lvl6pPr marL="2514600" indent="-228600" algn="l" defTabSz="457200" rtl="0" eaLnBrk="1" latinLnBrk="0" hangingPunct="1">
+              <a:spcBef>
+                <a:spcPct val="20000"/>
+              </a:spcBef>
+              <a:buFont typeface="Arial"/>
+              <a:buChar char="•"/>
+              <a:defRPr sz="2000" kern="1200">
+                <a:solidFill>
+                  <a:schemeClr val="tx1"/>
+                </a:solidFill>
+                <a:latin typeface="+mn-lt"/>
+                <a:ea typeface="+mn-ea"/>
+                <a:cs typeface="+mn-cs"/>
+              </a:defRPr>
+            </a:lvl6pPr>
+            <a:lvl7pPr marL="2971800" indent="-228600" algn="l" defTabSz="457200" rtl="0" eaLnBrk="1" latinLnBrk="0" hangingPunct="1">
+              <a:spcBef>
+                <a:spcPct val="20000"/>
+              </a:spcBef>
+              <a:buFont typeface="Arial"/>
+              <a:buChar char="•"/>
+              <a:defRPr sz="2000" kern="1200">
+                <a:solidFill>
+                  <a:schemeClr val="tx1"/>
+                </a:solidFill>
+                <a:latin typeface="+mn-lt"/>
+                <a:ea typeface="+mn-ea"/>
+                <a:cs typeface="+mn-cs"/>
+              </a:defRPr>
+            </a:lvl7pPr>
+            <a:lvl8pPr marL="3429000" indent="-228600" algn="l" defTabSz="457200" rtl="0" eaLnBrk="1" latinLnBrk="0" hangingPunct="1">
+              <a:spcBef>
+                <a:spcPct val="20000"/>
+              </a:spcBef>
+              <a:buFont typeface="Arial"/>
+              <a:buChar char="•"/>
+              <a:defRPr sz="2000" kern="1200">
+                <a:solidFill>
+                  <a:schemeClr val="tx1"/>
+                </a:solidFill>
+                <a:latin typeface="+mn-lt"/>
+                <a:ea typeface="+mn-ea"/>
+                <a:cs typeface="+mn-cs"/>
+              </a:defRPr>
+            </a:lvl8pPr>
+            <a:lvl9pPr marL="3886200" indent="-228600" algn="l" defTabSz="457200" rtl="0" eaLnBrk="1" latinLnBrk="0" hangingPunct="1">
+              <a:spcBef>
+                <a:spcPct val="20000"/>
+              </a:spcBef>
+              <a:buFont typeface="Arial"/>
+              <a:buChar char="•"/>
+              <a:defRPr sz="2000" kern="1200">
+                <a:solidFill>
+                  <a:schemeClr val="tx1"/>
+                </a:solidFill>
+                <a:latin typeface="+mn-lt"/>
+                <a:ea typeface="+mn-ea"/>
+                <a:cs typeface="+mn-cs"/>
+              </a:defRPr>
+            </a:lvl9pPr>
+          </a:lstStyle>
+          <a:p>
+            <a:pPr marL="0" indent="0">
+              <a:buFont typeface="Arial"/>
+              <a:buNone/>
+            </a:pPr>
+            <a:r>
+              <a:rPr lang="en-US" sz="1400" dirty="0" smtClean="0"/>
+              <a:t>Persona</a:t>
+            </a:r>
+          </a:p>
+          <a:p>
+            <a:pPr marL="0" indent="0">
+              <a:buFont typeface="Arial"/>
+              <a:buNone/>
+            </a:pPr>
+            <a:r>
+              <a:rPr lang="en-US" sz="1800" dirty="0" smtClean="0">
+                <a:latin typeface="Lato Black"/>
+                <a:cs typeface="Lato Black"/>
+              </a:rPr>
+              <a:t>General Admin</a:t>
+            </a:r>
+          </a:p>
+          <a:p>
+            <a:pPr marL="0" indent="0">
+              <a:buFont typeface="Arial"/>
+              <a:buNone/>
+            </a:pPr>
+            <a:endParaRPr lang="en-US" sz="1400" dirty="0" smtClean="0"/>
+          </a:p>
+          <a:p>
+            <a:pPr marL="0" indent="0">
+              <a:buFont typeface="Arial"/>
+              <a:buNone/>
+            </a:pPr>
+            <a:r>
+              <a:rPr lang="en-US" sz="1400" dirty="0" smtClean="0"/>
+              <a:t>Primary Goals</a:t>
+            </a:r>
+          </a:p>
+          <a:p>
+            <a:pPr marL="0" indent="0">
+              <a:buFont typeface="Arial"/>
+              <a:buNone/>
+            </a:pPr>
+            <a:r>
+              <a:rPr lang="en-US" sz="1800" dirty="0" smtClean="0">
+                <a:latin typeface="Lato Black"/>
+                <a:cs typeface="Lato Black"/>
+              </a:rPr>
+              <a:t>Configure email messages</a:t>
+            </a:r>
+          </a:p>
+          <a:p>
+            <a:pPr marL="0" indent="0">
+              <a:buFont typeface="Arial"/>
+              <a:buNone/>
+            </a:pPr>
+            <a:endParaRPr lang="en-US" sz="1400" dirty="0" smtClean="0">
+              <a:latin typeface="Lato Black"/>
+              <a:cs typeface="Lato Black"/>
+            </a:endParaRPr>
+          </a:p>
+          <a:p>
+            <a:pPr marL="0" indent="0">
+              <a:buFont typeface="Arial"/>
+              <a:buNone/>
+            </a:pPr>
+            <a:endParaRPr lang="en-US" sz="1400" dirty="0">
+              <a:latin typeface="Lato Black"/>
+              <a:cs typeface="Lato Black"/>
+            </a:endParaRPr>
+          </a:p>
+          <a:p>
+            <a:pPr marL="0" indent="0">
+              <a:buNone/>
+            </a:pPr>
+            <a:r>
+              <a:rPr lang="en-US" sz="1400" dirty="0" smtClean="0"/>
+              <a:t>Secondary Goals</a:t>
+            </a:r>
+            <a:endParaRPr lang="en-US" sz="1400" dirty="0"/>
+          </a:p>
+          <a:p>
+            <a:pPr marL="0" indent="0">
+              <a:buNone/>
+            </a:pPr>
+            <a:r>
+              <a:rPr lang="en-US" sz="1800" dirty="0" smtClean="0">
+                <a:latin typeface="Lato Black"/>
+                <a:cs typeface="Lato Black"/>
+              </a:rPr>
+              <a:t>Reviewer Persona</a:t>
+            </a:r>
+          </a:p>
+          <a:p>
+            <a:pPr marL="0" indent="0">
+              <a:buNone/>
+            </a:pPr>
+            <a:endParaRPr lang="en-US" sz="900" dirty="0" smtClean="0">
+              <a:latin typeface="Lato Black"/>
+              <a:cs typeface="Lato Black"/>
+            </a:endParaRPr>
+          </a:p>
+          <a:p>
+            <a:pPr marL="0" indent="0">
+              <a:buNone/>
+            </a:pPr>
+            <a:endParaRPr lang="en-US" sz="1200" dirty="0" smtClean="0">
+              <a:latin typeface="Lato Black"/>
+              <a:cs typeface="Lato Black"/>
+            </a:endParaRPr>
+          </a:p>
+          <a:p>
+            <a:pPr marL="0" indent="0">
+              <a:buNone/>
+            </a:pPr>
+            <a:r>
+              <a:rPr lang="en-US" sz="1400" dirty="0" smtClean="0"/>
+              <a:t>Confidence</a:t>
+            </a:r>
+            <a:endParaRPr lang="en-US" sz="1400" dirty="0"/>
+          </a:p>
+          <a:p>
+            <a:pPr marL="0" indent="0">
+              <a:buNone/>
+            </a:pPr>
+            <a:r>
+              <a:rPr lang="en-US" sz="1800" dirty="0" smtClean="0">
+                <a:latin typeface="Lato Black"/>
+                <a:cs typeface="Lato Black"/>
+              </a:rPr>
+              <a:t>Medium</a:t>
+            </a:r>
+            <a:endParaRPr lang="en-US" sz="1800" dirty="0">
+              <a:latin typeface="Lato Black"/>
+              <a:cs typeface="Lato Black"/>
+            </a:endParaRPr>
+          </a:p>
+          <a:p>
+            <a:pPr marL="0" indent="0">
+              <a:buNone/>
+            </a:pPr>
+            <a:endParaRPr lang="en-US" sz="1400" dirty="0">
+              <a:latin typeface="Lato Black"/>
+              <a:cs typeface="Lato Black"/>
+            </a:endParaRPr>
+          </a:p>
+          <a:p>
+            <a:pPr marL="0" indent="0">
+              <a:buFont typeface="Arial"/>
+              <a:buNone/>
+            </a:pPr>
+            <a:endParaRPr lang="en-US" sz="1400" dirty="0" smtClean="0">
+              <a:latin typeface="Lato Black"/>
+              <a:cs typeface="Lato Black"/>
+            </a:endParaRPr>
+          </a:p>
+          <a:p>
+            <a:pPr marL="0" indent="0">
+              <a:buFont typeface="Arial"/>
+              <a:buNone/>
+            </a:pPr>
+            <a:endParaRPr lang="en-US" sz="1400" dirty="0"/>
+          </a:p>
+        </p:txBody>
+      </p:sp>
+      <p:sp>
+        <p:nvSpPr>
+          <p:cNvPr id="14" name="Content Placeholder 1"/>
+          <p:cNvSpPr txBox="1">
+            <a:spLocks/>
+          </p:cNvSpPr>
+          <p:nvPr/>
+        </p:nvSpPr>
+        <p:spPr>
+          <a:xfrm>
+            <a:off x="5410862" y="437977"/>
+            <a:ext cx="1707829" cy="4554966"/>
+          </a:xfrm>
+          <a:prstGeom prst="rect">
+            <a:avLst/>
+          </a:prstGeom>
+        </p:spPr>
+        <p:txBody>
+          <a:bodyPr vert="horz" lIns="91440" tIns="45720" rIns="91440" bIns="45720" rtlCol="0">
+            <a:normAutofit/>
+          </a:bodyPr>
+          <a:lstStyle>
+            <a:lvl1pPr marL="342900" indent="-342900" algn="l" defTabSz="457200" rtl="0" eaLnBrk="1" latinLnBrk="0" hangingPunct="1">
+              <a:spcBef>
+                <a:spcPct val="20000"/>
+              </a:spcBef>
+              <a:buFont typeface="Arial"/>
+              <a:buChar char="•"/>
+              <a:defRPr sz="3200" kern="1200">
+                <a:solidFill>
+                  <a:schemeClr val="bg1"/>
+                </a:solidFill>
+                <a:latin typeface="Lato Light"/>
+                <a:ea typeface="+mn-ea"/>
+                <a:cs typeface="Lato Light"/>
+              </a:defRPr>
+            </a:lvl1pPr>
+            <a:lvl2pPr marL="742950" indent="-285750" algn="l" defTabSz="457200" rtl="0" eaLnBrk="1" latinLnBrk="0" hangingPunct="1">
+              <a:spcBef>
+                <a:spcPct val="20000"/>
+              </a:spcBef>
+              <a:buFont typeface="Arial"/>
+              <a:buChar char="–"/>
+              <a:defRPr sz="2800" kern="1200">
+                <a:solidFill>
+                  <a:schemeClr val="bg1"/>
+                </a:solidFill>
+                <a:latin typeface="Lato Light"/>
+                <a:ea typeface="+mn-ea"/>
+                <a:cs typeface="Lato Light"/>
+              </a:defRPr>
+            </a:lvl2pPr>
+            <a:lvl3pPr marL="1143000" indent="-228600" algn="l" defTabSz="457200" rtl="0" eaLnBrk="1" latinLnBrk="0" hangingPunct="1">
+              <a:spcBef>
+                <a:spcPct val="20000"/>
+              </a:spcBef>
+              <a:buFont typeface="Arial"/>
+              <a:buChar char="•"/>
+              <a:defRPr sz="2400" kern="1200">
+                <a:solidFill>
+                  <a:schemeClr val="bg1"/>
+                </a:solidFill>
+                <a:latin typeface="Lato Light"/>
+                <a:ea typeface="+mn-ea"/>
+                <a:cs typeface="Lato Light"/>
+              </a:defRPr>
+            </a:lvl3pPr>
+            <a:lvl4pPr marL="1600200" indent="-228600" algn="l" defTabSz="457200" rtl="0" eaLnBrk="1" latinLnBrk="0" hangingPunct="1">
+              <a:spcBef>
+                <a:spcPct val="20000"/>
+              </a:spcBef>
+              <a:buFont typeface="Arial"/>
+              <a:buChar char="–"/>
+              <a:defRPr sz="2000" kern="1200">
+                <a:solidFill>
+                  <a:schemeClr val="bg1"/>
+                </a:solidFill>
+                <a:latin typeface="Lato Light"/>
+                <a:ea typeface="+mn-ea"/>
+                <a:cs typeface="Lato Light"/>
+              </a:defRPr>
+            </a:lvl4pPr>
+            <a:lvl5pPr marL="2057400" indent="-228600" algn="l" defTabSz="457200" rtl="0" eaLnBrk="1" latinLnBrk="0" hangingPunct="1">
+              <a:spcBef>
+                <a:spcPct val="20000"/>
+              </a:spcBef>
+              <a:buFont typeface="Arial"/>
+              <a:buChar char="»"/>
+              <a:defRPr sz="2000" kern="1200">
+                <a:solidFill>
+                  <a:schemeClr val="bg1"/>
+                </a:solidFill>
+                <a:latin typeface="Lato Light"/>
+                <a:ea typeface="+mn-ea"/>
+                <a:cs typeface="Lato Light"/>
+              </a:defRPr>
+            </a:lvl5pPr>
+            <a:lvl6pPr marL="2514600" indent="-228600" algn="l" defTabSz="457200" rtl="0" eaLnBrk="1" latinLnBrk="0" hangingPunct="1">
+              <a:spcBef>
+                <a:spcPct val="20000"/>
+              </a:spcBef>
+              <a:buFont typeface="Arial"/>
+              <a:buChar char="•"/>
+              <a:defRPr sz="2000" kern="1200">
+                <a:solidFill>
+                  <a:schemeClr val="tx1"/>
+                </a:solidFill>
+                <a:latin typeface="+mn-lt"/>
+                <a:ea typeface="+mn-ea"/>
+                <a:cs typeface="+mn-cs"/>
+              </a:defRPr>
+            </a:lvl6pPr>
+            <a:lvl7pPr marL="2971800" indent="-228600" algn="l" defTabSz="457200" rtl="0" eaLnBrk="1" latinLnBrk="0" hangingPunct="1">
+              <a:spcBef>
+                <a:spcPct val="20000"/>
+              </a:spcBef>
+              <a:buFont typeface="Arial"/>
+              <a:buChar char="•"/>
+              <a:defRPr sz="2000" kern="1200">
+                <a:solidFill>
+                  <a:schemeClr val="tx1"/>
+                </a:solidFill>
+                <a:latin typeface="+mn-lt"/>
+                <a:ea typeface="+mn-ea"/>
+                <a:cs typeface="+mn-cs"/>
+              </a:defRPr>
+            </a:lvl7pPr>
+            <a:lvl8pPr marL="3429000" indent="-228600" algn="l" defTabSz="457200" rtl="0" eaLnBrk="1" latinLnBrk="0" hangingPunct="1">
+              <a:spcBef>
+                <a:spcPct val="20000"/>
+              </a:spcBef>
+              <a:buFont typeface="Arial"/>
+              <a:buChar char="•"/>
+              <a:defRPr sz="2000" kern="1200">
+                <a:solidFill>
+                  <a:schemeClr val="tx1"/>
+                </a:solidFill>
+                <a:latin typeface="+mn-lt"/>
+                <a:ea typeface="+mn-ea"/>
+                <a:cs typeface="+mn-cs"/>
+              </a:defRPr>
+            </a:lvl8pPr>
+            <a:lvl9pPr marL="3886200" indent="-228600" algn="l" defTabSz="457200" rtl="0" eaLnBrk="1" latinLnBrk="0" hangingPunct="1">
+              <a:spcBef>
+                <a:spcPct val="20000"/>
+              </a:spcBef>
+              <a:buFont typeface="Arial"/>
+              <a:buChar char="•"/>
+              <a:defRPr sz="2000" kern="1200">
+                <a:solidFill>
+                  <a:schemeClr val="tx1"/>
+                </a:solidFill>
+                <a:latin typeface="+mn-lt"/>
+                <a:ea typeface="+mn-ea"/>
+                <a:cs typeface="+mn-cs"/>
+              </a:defRPr>
+            </a:lvl9pPr>
+          </a:lstStyle>
+          <a:p>
+            <a:pPr marL="0" indent="0">
+              <a:buFont typeface="Arial"/>
+              <a:buNone/>
+            </a:pPr>
+            <a:r>
+              <a:rPr lang="en-US" sz="1400" dirty="0" smtClean="0"/>
+              <a:t>Persona</a:t>
+            </a:r>
+          </a:p>
+          <a:p>
+            <a:pPr marL="0" indent="0">
+              <a:buFont typeface="Arial"/>
+              <a:buNone/>
+            </a:pPr>
+            <a:r>
+              <a:rPr lang="en-US" sz="1800" dirty="0" smtClean="0">
+                <a:latin typeface="Lato Black"/>
+                <a:cs typeface="Lato Black"/>
+              </a:rPr>
+              <a:t>Champion</a:t>
+            </a:r>
+          </a:p>
+          <a:p>
+            <a:pPr marL="0" indent="0">
+              <a:buFont typeface="Arial"/>
+              <a:buNone/>
+            </a:pPr>
+            <a:endParaRPr lang="en-US" sz="1400" dirty="0" smtClean="0"/>
+          </a:p>
+          <a:p>
+            <a:pPr marL="0" indent="0">
+              <a:buFont typeface="Arial"/>
+              <a:buNone/>
+            </a:pPr>
+            <a:r>
+              <a:rPr lang="en-US" sz="1400" dirty="0" smtClean="0"/>
+              <a:t>Primary Goals</a:t>
+            </a:r>
+          </a:p>
+          <a:p>
+            <a:pPr marL="0" indent="0">
+              <a:buFont typeface="Arial"/>
+              <a:buNone/>
+            </a:pPr>
+            <a:r>
+              <a:rPr lang="en-US" sz="1800" dirty="0" smtClean="0">
+                <a:latin typeface="Lato Black"/>
+                <a:cs typeface="Lato Black"/>
+              </a:rPr>
+              <a:t>Manage User Access</a:t>
+            </a:r>
+          </a:p>
+          <a:p>
+            <a:pPr marL="0" indent="0">
+              <a:buFont typeface="Arial"/>
+              <a:buNone/>
+            </a:pPr>
+            <a:endParaRPr lang="en-US" sz="2400" dirty="0" smtClean="0">
+              <a:latin typeface="Lato Black"/>
+              <a:cs typeface="Lato Black"/>
+            </a:endParaRPr>
+          </a:p>
+          <a:p>
+            <a:pPr marL="0" indent="0">
+              <a:buNone/>
+            </a:pPr>
+            <a:r>
+              <a:rPr lang="en-US" sz="1400" dirty="0" smtClean="0"/>
+              <a:t>Secondary Goals</a:t>
+            </a:r>
+            <a:endParaRPr lang="en-US" sz="1400" dirty="0"/>
+          </a:p>
+          <a:p>
+            <a:pPr marL="0" indent="0">
+              <a:buNone/>
+            </a:pPr>
+            <a:r>
+              <a:rPr lang="en-US" sz="1800" dirty="0" smtClean="0">
+                <a:latin typeface="Lato Black"/>
+                <a:cs typeface="Lato Black"/>
+              </a:rPr>
+              <a:t>General Admin Persona</a:t>
+            </a:r>
+          </a:p>
+          <a:p>
+            <a:pPr marL="0" indent="0">
+              <a:buNone/>
+            </a:pPr>
+            <a:endParaRPr lang="en-US" sz="900" dirty="0" smtClean="0">
+              <a:latin typeface="Lato Black"/>
+              <a:cs typeface="Lato Black"/>
+            </a:endParaRPr>
+          </a:p>
+          <a:p>
+            <a:pPr marL="0" indent="0">
+              <a:buNone/>
+            </a:pPr>
+            <a:r>
+              <a:rPr lang="en-US" sz="1400" dirty="0"/>
+              <a:t>Confidence</a:t>
+            </a:r>
+          </a:p>
+          <a:p>
+            <a:pPr marL="0" indent="0">
+              <a:buNone/>
+            </a:pPr>
+            <a:r>
+              <a:rPr lang="en-US" sz="1800" dirty="0" smtClean="0">
+                <a:latin typeface="Lato Black"/>
+                <a:cs typeface="Lato Black"/>
+              </a:rPr>
+              <a:t>High</a:t>
+            </a:r>
+            <a:endParaRPr lang="en-US" sz="1800" dirty="0">
+              <a:latin typeface="Lato Black"/>
+              <a:cs typeface="Lato Black"/>
+            </a:endParaRPr>
+          </a:p>
+          <a:p>
+            <a:pPr marL="0" indent="0">
+              <a:buNone/>
+            </a:pPr>
+            <a:endParaRPr lang="en-US" sz="1400" dirty="0">
+              <a:latin typeface="Lato Black"/>
+              <a:cs typeface="Lato Black"/>
+            </a:endParaRPr>
+          </a:p>
+          <a:p>
+            <a:pPr marL="0" indent="0">
+              <a:buFont typeface="Arial"/>
+              <a:buNone/>
+            </a:pPr>
+            <a:endParaRPr lang="en-US" sz="1400" dirty="0" smtClean="0">
+              <a:latin typeface="Lato Black"/>
+              <a:cs typeface="Lato Black"/>
+            </a:endParaRPr>
+          </a:p>
+          <a:p>
+            <a:pPr marL="0" indent="0">
+              <a:buFont typeface="Arial"/>
+              <a:buNone/>
+            </a:pPr>
+            <a:endParaRPr lang="en-US" sz="1400" dirty="0"/>
+          </a:p>
+        </p:txBody>
+      </p:sp>
+      <p:sp>
+        <p:nvSpPr>
+          <p:cNvPr id="15" name="Content Placeholder 1"/>
+          <p:cNvSpPr txBox="1">
+            <a:spLocks/>
+          </p:cNvSpPr>
+          <p:nvPr/>
+        </p:nvSpPr>
+        <p:spPr>
+          <a:xfrm>
+            <a:off x="7094059" y="437977"/>
+            <a:ext cx="1707829" cy="4554966"/>
+          </a:xfrm>
+          <a:prstGeom prst="rect">
+            <a:avLst/>
+          </a:prstGeom>
+        </p:spPr>
+        <p:txBody>
+          <a:bodyPr vert="horz" lIns="91440" tIns="45720" rIns="91440" bIns="45720" rtlCol="0">
+            <a:normAutofit/>
+          </a:bodyPr>
+          <a:lstStyle>
+            <a:lvl1pPr marL="342900" indent="-342900" algn="l" defTabSz="457200" rtl="0" eaLnBrk="1" latinLnBrk="0" hangingPunct="1">
+              <a:spcBef>
+                <a:spcPct val="20000"/>
+              </a:spcBef>
+              <a:buFont typeface="Arial"/>
+              <a:buChar char="•"/>
+              <a:defRPr sz="3200" kern="1200">
+                <a:solidFill>
+                  <a:schemeClr val="bg1"/>
+                </a:solidFill>
+                <a:latin typeface="Lato Light"/>
+                <a:ea typeface="+mn-ea"/>
+                <a:cs typeface="Lato Light"/>
+              </a:defRPr>
+            </a:lvl1pPr>
+            <a:lvl2pPr marL="742950" indent="-285750" algn="l" defTabSz="457200" rtl="0" eaLnBrk="1" latinLnBrk="0" hangingPunct="1">
+              <a:spcBef>
+                <a:spcPct val="20000"/>
+              </a:spcBef>
+              <a:buFont typeface="Arial"/>
+              <a:buChar char="–"/>
+              <a:defRPr sz="2800" kern="1200">
+                <a:solidFill>
+                  <a:schemeClr val="bg1"/>
+                </a:solidFill>
+                <a:latin typeface="Lato Light"/>
+                <a:ea typeface="+mn-ea"/>
+                <a:cs typeface="Lato Light"/>
+              </a:defRPr>
+            </a:lvl2pPr>
+            <a:lvl3pPr marL="1143000" indent="-228600" algn="l" defTabSz="457200" rtl="0" eaLnBrk="1" latinLnBrk="0" hangingPunct="1">
+              <a:spcBef>
+                <a:spcPct val="20000"/>
+              </a:spcBef>
+              <a:buFont typeface="Arial"/>
+              <a:buChar char="•"/>
+              <a:defRPr sz="2400" kern="1200">
+                <a:solidFill>
+                  <a:schemeClr val="bg1"/>
+                </a:solidFill>
+                <a:latin typeface="Lato Light"/>
+                <a:ea typeface="+mn-ea"/>
+                <a:cs typeface="Lato Light"/>
+              </a:defRPr>
+            </a:lvl3pPr>
+            <a:lvl4pPr marL="1600200" indent="-228600" algn="l" defTabSz="457200" rtl="0" eaLnBrk="1" latinLnBrk="0" hangingPunct="1">
+              <a:spcBef>
+                <a:spcPct val="20000"/>
+              </a:spcBef>
+              <a:buFont typeface="Arial"/>
+              <a:buChar char="–"/>
+              <a:defRPr sz="2000" kern="1200">
+                <a:solidFill>
+                  <a:schemeClr val="bg1"/>
+                </a:solidFill>
+                <a:latin typeface="Lato Light"/>
+                <a:ea typeface="+mn-ea"/>
+                <a:cs typeface="Lato Light"/>
+              </a:defRPr>
+            </a:lvl4pPr>
+            <a:lvl5pPr marL="2057400" indent="-228600" algn="l" defTabSz="457200" rtl="0" eaLnBrk="1" latinLnBrk="0" hangingPunct="1">
+              <a:spcBef>
+                <a:spcPct val="20000"/>
+              </a:spcBef>
+              <a:buFont typeface="Arial"/>
+              <a:buChar char="»"/>
+              <a:defRPr sz="2000" kern="1200">
+                <a:solidFill>
+                  <a:schemeClr val="bg1"/>
+                </a:solidFill>
+                <a:latin typeface="Lato Light"/>
+                <a:ea typeface="+mn-ea"/>
+                <a:cs typeface="Lato Light"/>
+              </a:defRPr>
+            </a:lvl5pPr>
+            <a:lvl6pPr marL="2514600" indent="-228600" algn="l" defTabSz="457200" rtl="0" eaLnBrk="1" latinLnBrk="0" hangingPunct="1">
+              <a:spcBef>
+                <a:spcPct val="20000"/>
+              </a:spcBef>
+              <a:buFont typeface="Arial"/>
+              <a:buChar char="•"/>
+              <a:defRPr sz="2000" kern="1200">
+                <a:solidFill>
+                  <a:schemeClr val="tx1"/>
+                </a:solidFill>
+                <a:latin typeface="+mn-lt"/>
+                <a:ea typeface="+mn-ea"/>
+                <a:cs typeface="+mn-cs"/>
+              </a:defRPr>
+            </a:lvl6pPr>
+            <a:lvl7pPr marL="2971800" indent="-228600" algn="l" defTabSz="457200" rtl="0" eaLnBrk="1" latinLnBrk="0" hangingPunct="1">
+              <a:spcBef>
+                <a:spcPct val="20000"/>
+              </a:spcBef>
+              <a:buFont typeface="Arial"/>
+              <a:buChar char="•"/>
+              <a:defRPr sz="2000" kern="1200">
+                <a:solidFill>
+                  <a:schemeClr val="tx1"/>
+                </a:solidFill>
+                <a:latin typeface="+mn-lt"/>
+                <a:ea typeface="+mn-ea"/>
+                <a:cs typeface="+mn-cs"/>
+              </a:defRPr>
+            </a:lvl7pPr>
+            <a:lvl8pPr marL="3429000" indent="-228600" algn="l" defTabSz="457200" rtl="0" eaLnBrk="1" latinLnBrk="0" hangingPunct="1">
+              <a:spcBef>
+                <a:spcPct val="20000"/>
+              </a:spcBef>
+              <a:buFont typeface="Arial"/>
+              <a:buChar char="•"/>
+              <a:defRPr sz="2000" kern="1200">
+                <a:solidFill>
+                  <a:schemeClr val="tx1"/>
+                </a:solidFill>
+                <a:latin typeface="+mn-lt"/>
+                <a:ea typeface="+mn-ea"/>
+                <a:cs typeface="+mn-cs"/>
+              </a:defRPr>
+            </a:lvl8pPr>
+            <a:lvl9pPr marL="3886200" indent="-228600" algn="l" defTabSz="457200" rtl="0" eaLnBrk="1" latinLnBrk="0" hangingPunct="1">
+              <a:spcBef>
+                <a:spcPct val="20000"/>
+              </a:spcBef>
+              <a:buFont typeface="Arial"/>
+              <a:buChar char="•"/>
+              <a:defRPr sz="2000" kern="1200">
+                <a:solidFill>
+                  <a:schemeClr val="tx1"/>
+                </a:solidFill>
+                <a:latin typeface="+mn-lt"/>
+                <a:ea typeface="+mn-ea"/>
+                <a:cs typeface="+mn-cs"/>
+              </a:defRPr>
+            </a:lvl9pPr>
+          </a:lstStyle>
+          <a:p>
+            <a:pPr marL="0" indent="0">
+              <a:buFont typeface="Arial"/>
+              <a:buNone/>
+            </a:pPr>
+            <a:r>
+              <a:rPr lang="en-US" sz="1400" dirty="0" smtClean="0"/>
+              <a:t>Persona</a:t>
+            </a:r>
+          </a:p>
+          <a:p>
+            <a:pPr marL="0" indent="0">
+              <a:buFont typeface="Arial"/>
+              <a:buNone/>
+            </a:pPr>
+            <a:r>
+              <a:rPr lang="en-US" sz="1800" dirty="0" smtClean="0">
+                <a:latin typeface="Lato Black"/>
+                <a:cs typeface="Lato Black"/>
+              </a:rPr>
+              <a:t>Overall Admin</a:t>
+            </a:r>
+          </a:p>
+          <a:p>
+            <a:pPr marL="0" indent="0">
+              <a:buFont typeface="Arial"/>
+              <a:buNone/>
+            </a:pPr>
+            <a:endParaRPr lang="en-US" sz="1400" dirty="0" smtClean="0"/>
+          </a:p>
+          <a:p>
+            <a:pPr marL="0" indent="0">
+              <a:buFont typeface="Arial"/>
+              <a:buNone/>
+            </a:pPr>
+            <a:r>
+              <a:rPr lang="en-US" sz="1400" dirty="0" smtClean="0"/>
+              <a:t>Primary Goals</a:t>
+            </a:r>
+          </a:p>
+          <a:p>
+            <a:pPr marL="0" indent="0">
+              <a:buFont typeface="Arial"/>
+              <a:buNone/>
+            </a:pPr>
+            <a:r>
+              <a:rPr lang="en-US" sz="1800" dirty="0" smtClean="0">
+                <a:latin typeface="Lato Black"/>
+                <a:cs typeface="Lato Black"/>
+              </a:rPr>
+              <a:t>Maintain and Configure Site</a:t>
+            </a:r>
+          </a:p>
+          <a:p>
+            <a:pPr marL="0" indent="0">
+              <a:buFont typeface="Arial"/>
+              <a:buNone/>
+            </a:pPr>
+            <a:endParaRPr lang="en-US" sz="2400" dirty="0" smtClean="0">
+              <a:latin typeface="Lato Black"/>
+              <a:cs typeface="Lato Black"/>
+            </a:endParaRPr>
+          </a:p>
+          <a:p>
+            <a:pPr marL="0" indent="0">
+              <a:buNone/>
+            </a:pPr>
+            <a:r>
+              <a:rPr lang="en-US" sz="1400" dirty="0" smtClean="0"/>
+              <a:t>Secondary Goals</a:t>
+            </a:r>
+            <a:endParaRPr lang="en-US" sz="1400" dirty="0"/>
+          </a:p>
+          <a:p>
+            <a:pPr marL="0" indent="0">
+              <a:buNone/>
+            </a:pPr>
+            <a:r>
+              <a:rPr lang="en-US" sz="1800" dirty="0" smtClean="0">
+                <a:latin typeface="Lato Black"/>
+                <a:cs typeface="Lato Black"/>
+              </a:rPr>
+              <a:t>Champion</a:t>
+            </a:r>
+            <a:endParaRPr lang="en-US" sz="1400" dirty="0" smtClean="0">
+              <a:latin typeface="Lato Black"/>
+              <a:cs typeface="Lato Black"/>
+            </a:endParaRPr>
+          </a:p>
+          <a:p>
+            <a:pPr marL="0" indent="0">
+              <a:buNone/>
+            </a:pPr>
+            <a:endParaRPr lang="en-US" sz="1400" dirty="0" smtClean="0">
+              <a:latin typeface="Lato Black"/>
+              <a:cs typeface="Lato Black"/>
+            </a:endParaRPr>
+          </a:p>
+          <a:p>
+            <a:pPr marL="0" indent="0">
+              <a:buNone/>
+            </a:pPr>
+            <a:endParaRPr lang="en-US" sz="1200" dirty="0">
+              <a:latin typeface="Lato Black"/>
+              <a:cs typeface="Lato Black"/>
+            </a:endParaRPr>
+          </a:p>
+          <a:p>
+            <a:pPr marL="0" indent="0">
+              <a:buNone/>
+            </a:pPr>
+            <a:endParaRPr lang="en-US" sz="1200" dirty="0" smtClean="0">
+              <a:latin typeface="Lato Black"/>
+              <a:cs typeface="Lato Black"/>
+            </a:endParaRPr>
+          </a:p>
+          <a:p>
+            <a:pPr marL="0" indent="0">
+              <a:buNone/>
+            </a:pPr>
+            <a:r>
+              <a:rPr lang="en-US" sz="1400" dirty="0"/>
+              <a:t>Confidence</a:t>
+            </a:r>
+          </a:p>
+          <a:p>
+            <a:pPr marL="0" indent="0">
+              <a:buNone/>
+            </a:pPr>
+            <a:r>
+              <a:rPr lang="en-US" sz="1800" dirty="0" smtClean="0">
+                <a:latin typeface="Lato Black"/>
+                <a:cs typeface="Lato Black"/>
+              </a:rPr>
+              <a:t>Expert</a:t>
+            </a:r>
+            <a:endParaRPr lang="en-US" sz="1400" dirty="0">
+              <a:latin typeface="Lato Black"/>
+              <a:cs typeface="Lato Black"/>
+            </a:endParaRPr>
+          </a:p>
+          <a:p>
+            <a:pPr marL="0" indent="0">
+              <a:buNone/>
+            </a:pPr>
+            <a:endParaRPr lang="en-US" sz="1400" dirty="0">
+              <a:latin typeface="Lato Black"/>
+              <a:cs typeface="Lato Black"/>
+            </a:endParaRPr>
+          </a:p>
+          <a:p>
+            <a:pPr marL="0" indent="0">
+              <a:buFont typeface="Arial"/>
+              <a:buNone/>
+            </a:pPr>
+            <a:endParaRPr lang="en-US" sz="1400" dirty="0" smtClean="0">
+              <a:latin typeface="Lato Black"/>
+              <a:cs typeface="Lato Black"/>
+            </a:endParaRPr>
+          </a:p>
+          <a:p>
+            <a:pPr marL="0" indent="0">
+              <a:buFont typeface="Arial"/>
+              <a:buNone/>
+            </a:pPr>
+            <a:endParaRPr lang="en-US" sz="1400" dirty="0"/>
+          </a:p>
+        </p:txBody>
+      </p:sp>
+    </p:spTree>
+    <p:extLst>
+      <p:ext uri="{BB962C8B-B14F-4D97-AF65-F5344CB8AC3E}">
+        <p14:creationId xmlns:p14="http://schemas.microsoft.com/office/powerpoint/2010/main" val="3102510561"/>
+      </p:ext>
+    </p:extLst>
+  </p:cSld>
+  <p:clrMapOvr>
+    <a:masterClrMapping/>
+  </p:clrMapOvr>
+  <p:timing>
+    <p:tnLst>
+      <p:par>
+        <p:cTn xmlns:p14="http://schemas.microsoft.com/office/powerpoint/2010/main" id="1" dur="indefinite" restart="never" nodeType="tmRoot"/>
+      </p:par>
+    </p:tnLst>
+  </p:timing>
+</p:sld>
+</file>
+
+<file path=ppt/slides/slide16.xml><?xml version="1.0" encoding="utf-8"?>
+<p:sld xmlns:a="http://schemas.openxmlformats.org/drawingml/2006/main" xmlns:r="http://schemas.openxmlformats.org/officeDocument/2006/relationships" xmlns:p="http://schemas.openxmlformats.org/presentationml/2006/main">
+  <p:cSld>
+    <p:spTree>
+      <p:nvGrpSpPr>
+        <p:cNvPr id="1" name=""/>
+        <p:cNvGrpSpPr/>
+        <p:nvPr/>
+      </p:nvGrpSpPr>
+      <p:grpSpPr>
+        <a:xfrm>
+          <a:off x="0" y="0"/>
+          <a:ext cx="0" cy="0"/>
+          <a:chOff x="0" y="0"/>
+          <a:chExt cx="0" cy="0"/>
+        </a:xfrm>
+      </p:grpSpPr>
+      <p:sp>
+        <p:nvSpPr>
+          <p:cNvPr id="2" name="Content Placeholder 1"/>
+          <p:cNvSpPr>
+            <a:spLocks noGrp="1"/>
+          </p:cNvSpPr>
+          <p:nvPr>
+            <p:ph idx="1"/>
+          </p:nvPr>
+        </p:nvSpPr>
+        <p:spPr>
+          <a:xfrm>
+            <a:off x="457200" y="874513"/>
+            <a:ext cx="8229600" cy="4096533"/>
+          </a:xfrm>
+        </p:spPr>
+        <p:txBody>
+          <a:bodyPr>
+            <a:normAutofit fontScale="47500" lnSpcReduction="20000"/>
+          </a:bodyPr>
+          <a:lstStyle/>
+          <a:p>
+            <a:pPr marL="0" indent="0">
+              <a:buNone/>
+            </a:pPr>
+            <a:r>
+              <a:rPr lang="en-US" sz="2900" dirty="0" smtClean="0"/>
+              <a:t>Define the Problem</a:t>
+            </a:r>
+          </a:p>
+          <a:p>
+            <a:pPr marL="0" indent="0">
+              <a:buNone/>
+            </a:pPr>
+            <a:r>
+              <a:rPr lang="en-US" sz="3800" dirty="0">
+                <a:latin typeface="Lato Black"/>
+                <a:cs typeface="Lato Black"/>
+              </a:rPr>
+              <a:t>Submitters</a:t>
+            </a:r>
+            <a:r>
+              <a:rPr lang="en-US" sz="3800" dirty="0"/>
+              <a:t> need to be able to easily submit ideas, track the status of ideas, and view submitted ideas.</a:t>
+            </a:r>
+          </a:p>
+          <a:p>
+            <a:pPr marL="0" indent="0">
+              <a:buNone/>
+            </a:pPr>
+            <a:endParaRPr lang="en-US" sz="3800" dirty="0"/>
+          </a:p>
+          <a:p>
+            <a:pPr marL="0" indent="0">
+              <a:buNone/>
+            </a:pPr>
+            <a:r>
+              <a:rPr lang="en-US" sz="3800" dirty="0">
+                <a:latin typeface="Lato Black"/>
+                <a:cs typeface="Lato Black"/>
+              </a:rPr>
+              <a:t>Business Reviewers </a:t>
+            </a:r>
+            <a:r>
+              <a:rPr lang="en-US" sz="3800" dirty="0"/>
+              <a:t>need to be able to easily review submitted ideas, while receiving meaningful notifications of required action</a:t>
+            </a:r>
+            <a:r>
+              <a:rPr lang="en-US" sz="3800" dirty="0" smtClean="0"/>
+              <a:t>.</a:t>
+            </a:r>
+          </a:p>
+          <a:p>
+            <a:pPr marL="0" indent="0">
+              <a:buNone/>
+            </a:pPr>
+            <a:endParaRPr lang="en-US" sz="3800" dirty="0" smtClean="0"/>
+          </a:p>
+          <a:p>
+            <a:pPr marL="0" indent="0">
+              <a:buNone/>
+            </a:pPr>
+            <a:r>
+              <a:rPr lang="en-US" sz="3800" dirty="0">
+                <a:latin typeface="Lato Black"/>
+                <a:cs typeface="Lato Black"/>
+              </a:rPr>
+              <a:t>General Admins </a:t>
+            </a:r>
+            <a:r>
+              <a:rPr lang="en-US" sz="3800" dirty="0"/>
+              <a:t>need to be able to easily configure email messages, as well as approve ideas</a:t>
+            </a:r>
+            <a:r>
+              <a:rPr lang="en-US" sz="3800" dirty="0" smtClean="0"/>
+              <a:t>.</a:t>
+            </a:r>
+          </a:p>
+          <a:p>
+            <a:pPr marL="0" indent="0">
+              <a:buNone/>
+            </a:pPr>
+            <a:endParaRPr lang="en-US" sz="3800" dirty="0"/>
+          </a:p>
+          <a:p>
+            <a:pPr marL="0" indent="0">
+              <a:buNone/>
+            </a:pPr>
+            <a:r>
+              <a:rPr lang="en-US" sz="3800" dirty="0" smtClean="0">
+                <a:latin typeface="Lato Black"/>
+                <a:cs typeface="Lato Black"/>
+              </a:rPr>
+              <a:t>Innovation Champions </a:t>
+            </a:r>
+            <a:r>
+              <a:rPr lang="en-US" sz="3800" dirty="0" smtClean="0"/>
+              <a:t>need </a:t>
+            </a:r>
+            <a:r>
+              <a:rPr lang="en-US" sz="3800" dirty="0"/>
+              <a:t>to be able to run campaigns, configure user access, and review ideas</a:t>
+            </a:r>
+            <a:r>
+              <a:rPr lang="en-US" sz="3800" dirty="0" smtClean="0"/>
+              <a:t>.</a:t>
+            </a:r>
+          </a:p>
+          <a:p>
+            <a:pPr marL="0" indent="0">
+              <a:buNone/>
+            </a:pPr>
+            <a:endParaRPr lang="en-US" sz="3800" dirty="0" smtClean="0"/>
+          </a:p>
+          <a:p>
+            <a:pPr marL="0" indent="0">
+              <a:buNone/>
+            </a:pPr>
+            <a:r>
+              <a:rPr lang="en-US" sz="3800" dirty="0" smtClean="0">
+                <a:latin typeface="Lato Black"/>
+                <a:cs typeface="Lato Black"/>
+              </a:rPr>
+              <a:t>Overall </a:t>
+            </a:r>
+            <a:r>
+              <a:rPr lang="en-US" sz="3800" dirty="0">
+                <a:latin typeface="Lato Black"/>
+                <a:cs typeface="Lato Black"/>
+              </a:rPr>
+              <a:t>Admins </a:t>
+            </a:r>
+            <a:r>
+              <a:rPr lang="en-US" sz="3800" dirty="0"/>
+              <a:t>need to be able to maintain and configure the site, as well as manage user access and onboard and delegate new users of more experienced personas</a:t>
+            </a:r>
+            <a:r>
+              <a:rPr lang="en-US" sz="3800" dirty="0" smtClean="0"/>
+              <a:t>.</a:t>
+            </a:r>
+            <a:endParaRPr lang="en-US" sz="3800" dirty="0"/>
+          </a:p>
+        </p:txBody>
+      </p:sp>
+    </p:spTree>
+    <p:extLst>
+      <p:ext uri="{BB962C8B-B14F-4D97-AF65-F5344CB8AC3E}">
+        <p14:creationId xmlns:p14="http://schemas.microsoft.com/office/powerpoint/2010/main" val="3929268679"/>
+      </p:ext>
+    </p:extLst>
+  </p:cSld>
+  <p:clrMapOvr>
+    <a:masterClrMapping/>
+  </p:clrMapOvr>
+  <p:timing>
+    <p:tnLst>
+      <p:par>
+        <p:cTn xmlns:p14="http://schemas.microsoft.com/office/powerpoint/2010/main" id="1" dur="indefinite" restart="never" nodeType="tmRoot"/>
+      </p:par>
+    </p:tnLst>
+  </p:timing>
+</p:sld>
+</file>
+
+<file path=ppt/slides/slide17.xml><?xml version="1.0" encoding="utf-8"?>
+<p:sld xmlns:a="http://schemas.openxmlformats.org/drawingml/2006/main" xmlns:r="http://schemas.openxmlformats.org/officeDocument/2006/relationships" xmlns:p="http://schemas.openxmlformats.org/presentationml/2006/main">
+  <p:cSld>
+    <p:spTree>
+      <p:nvGrpSpPr>
+        <p:cNvPr id="1" name=""/>
+        <p:cNvGrpSpPr/>
+        <p:nvPr/>
+      </p:nvGrpSpPr>
+      <p:grpSpPr>
+        <a:xfrm>
+          <a:off x="0" y="0"/>
+          <a:ext cx="0" cy="0"/>
+          <a:chOff x="0" y="0"/>
+          <a:chExt cx="0" cy="0"/>
+        </a:xfrm>
+      </p:grpSpPr>
+      <p:pic>
+        <p:nvPicPr>
+          <p:cNvPr id="3" name="Picture 2" descr="idea2.jpg"/>
+          <p:cNvPicPr>
+            <a:picLocks noChangeAspect="1"/>
+          </p:cNvPicPr>
+          <p:nvPr/>
+        </p:nvPicPr>
+        <p:blipFill rotWithShape="1">
+          <a:blip r:embed="rId2">
+            <a:extLst>
+              <a:ext uri="{28A0092B-C50C-407E-A947-70E740481C1C}">
+                <a14:useLocalDpi xmlns:a14="http://schemas.microsoft.com/office/drawing/2010/main" val="0"/>
+              </a:ext>
+            </a:extLst>
+          </a:blip>
+          <a:srcRect t="9025"/>
+          <a:stretch/>
+        </p:blipFill>
+        <p:spPr>
+          <a:xfrm>
+            <a:off x="0" y="-1"/>
+            <a:ext cx="9144000" cy="5548629"/>
+          </a:xfrm>
+          <a:prstGeom prst="rect">
+            <a:avLst/>
+          </a:prstGeom>
+        </p:spPr>
+      </p:pic>
+    </p:spTree>
+    <p:extLst>
+      <p:ext uri="{BB962C8B-B14F-4D97-AF65-F5344CB8AC3E}">
+        <p14:creationId xmlns:p14="http://schemas.microsoft.com/office/powerpoint/2010/main" val="2809983145"/>
+      </p:ext>
+    </p:extLst>
+  </p:cSld>
+  <p:clrMapOvr>
+    <a:masterClrMapping/>
+  </p:clrMapOvr>
+</p:sld>
+</file>
+
+<file path=ppt/slides/slide18.xml><?xml version="1.0" encoding="utf-8"?>
+<p:sld xmlns:a="http://schemas.openxmlformats.org/drawingml/2006/main" xmlns:r="http://schemas.openxmlformats.org/officeDocument/2006/relationships" xmlns:p="http://schemas.openxmlformats.org/presentationml/2006/main">
+  <p:cSld>
+    <p:spTree>
+      <p:nvGrpSpPr>
+        <p:cNvPr id="1" name=""/>
+        <p:cNvGrpSpPr/>
+        <p:nvPr/>
+      </p:nvGrpSpPr>
+      <p:grpSpPr>
+        <a:xfrm>
+          <a:off x="0" y="0"/>
+          <a:ext cx="0" cy="0"/>
+          <a:chOff x="0" y="0"/>
+          <a:chExt cx="0" cy="0"/>
+        </a:xfrm>
+      </p:grpSpPr>
+      <p:sp>
+        <p:nvSpPr>
+          <p:cNvPr id="2" name="Content Placeholder 1"/>
+          <p:cNvSpPr>
+            <a:spLocks noGrp="1"/>
+          </p:cNvSpPr>
+          <p:nvPr>
+            <p:ph idx="1"/>
+          </p:nvPr>
+        </p:nvSpPr>
+        <p:spPr>
+          <a:xfrm>
+            <a:off x="457200" y="2094000"/>
+            <a:ext cx="8229600" cy="955500"/>
+          </a:xfrm>
+        </p:spPr>
+        <p:txBody>
+          <a:bodyPr/>
+          <a:lstStyle/>
+          <a:p>
+            <a:pPr marL="0" indent="0" algn="ctr">
+              <a:buNone/>
+            </a:pPr>
+            <a:r>
+              <a:rPr lang="en-US" sz="1400" dirty="0" smtClean="0"/>
+              <a:t>Project 1</a:t>
+            </a:r>
+          </a:p>
+          <a:p>
+            <a:pPr marL="0" indent="0" algn="ctr">
+              <a:buNone/>
+            </a:pPr>
+            <a:r>
+              <a:rPr lang="en-US" dirty="0" smtClean="0">
+                <a:latin typeface="Lato Black"/>
+                <a:cs typeface="Lato Black"/>
+              </a:rPr>
+              <a:t>Employee </a:t>
+            </a:r>
+            <a:r>
+              <a:rPr lang="en-US" dirty="0" smtClean="0">
+                <a:latin typeface="Lato Black"/>
+                <a:cs typeface="Lato Black"/>
+              </a:rPr>
+              <a:t>Vacation Tracker</a:t>
+            </a:r>
+            <a:endParaRPr lang="en-US" dirty="0">
+              <a:latin typeface="Lato Black"/>
+              <a:cs typeface="Lato Black"/>
+            </a:endParaRPr>
+          </a:p>
+        </p:txBody>
+      </p:sp>
+    </p:spTree>
+    <p:extLst>
+      <p:ext uri="{BB962C8B-B14F-4D97-AF65-F5344CB8AC3E}">
+        <p14:creationId xmlns:p14="http://schemas.microsoft.com/office/powerpoint/2010/main" val="3483983878"/>
+      </p:ext>
+    </p:extLst>
+  </p:cSld>
+  <p:clrMapOvr>
+    <a:masterClrMapping/>
+  </p:clrMapOvr>
+  <p:timing>
+    <p:tnLst>
+      <p:par>
+        <p:cTn xmlns:p14="http://schemas.microsoft.com/office/powerpoint/2010/main" id="1" dur="indefinite" restart="never" nodeType="tmRoot"/>
+      </p:par>
+    </p:tnLst>
+  </p:timing>
+</p:sld>
+</file>
+
+<file path=ppt/slides/slide19.xml><?xml version="1.0" encoding="utf-8"?>
+<p:sld xmlns:a="http://schemas.openxmlformats.org/drawingml/2006/main" xmlns:r="http://schemas.openxmlformats.org/officeDocument/2006/relationships" xmlns:p="http://schemas.openxmlformats.org/presentationml/2006/main">
+  <p:cSld>
+    <p:spTree>
+      <p:nvGrpSpPr>
+        <p:cNvPr id="1" name=""/>
+        <p:cNvGrpSpPr/>
+        <p:nvPr/>
+      </p:nvGrpSpPr>
+      <p:grpSpPr>
+        <a:xfrm>
+          <a:off x="0" y="0"/>
+          <a:ext cx="0" cy="0"/>
+          <a:chOff x="0" y="0"/>
+          <a:chExt cx="0" cy="0"/>
+        </a:xfrm>
+      </p:grpSpPr>
+      <p:sp>
+        <p:nvSpPr>
+          <p:cNvPr id="2" name="Content Placeholder 1"/>
+          <p:cNvSpPr>
+            <a:spLocks noGrp="1"/>
+          </p:cNvSpPr>
+          <p:nvPr>
+            <p:ph idx="1"/>
+          </p:nvPr>
+        </p:nvSpPr>
+        <p:spPr>
+          <a:xfrm>
+            <a:off x="457200" y="874513"/>
+            <a:ext cx="8229600" cy="3581909"/>
+          </a:xfrm>
+        </p:spPr>
+        <p:txBody>
+          <a:bodyPr>
+            <a:normAutofit fontScale="85000" lnSpcReduction="20000"/>
+          </a:bodyPr>
+          <a:lstStyle/>
+          <a:p>
+            <a:pPr marL="0" indent="0">
+              <a:buNone/>
+            </a:pPr>
+            <a:r>
+              <a:rPr lang="en-US" sz="1600" dirty="0" smtClean="0"/>
+              <a:t>Brief</a:t>
+            </a:r>
+            <a:endParaRPr lang="en-US" sz="2000" dirty="0" smtClean="0"/>
+          </a:p>
+          <a:p>
+            <a:pPr marL="0" indent="0">
+              <a:buNone/>
+            </a:pPr>
+            <a:r>
+              <a:rPr lang="en-US" dirty="0"/>
+              <a:t>The Employee Vacation Tracker allows employees to request time off through a simple interface, as well as view the time off of their </a:t>
+            </a:r>
+            <a:r>
+              <a:rPr lang="en-US" dirty="0" smtClean="0"/>
+              <a:t>team.</a:t>
+            </a:r>
+            <a:endParaRPr lang="en-US" dirty="0"/>
+          </a:p>
+          <a:p>
+            <a:pPr marL="0" indent="0">
+              <a:buNone/>
+            </a:pPr>
+            <a:endParaRPr lang="en-US" sz="3900" dirty="0"/>
+          </a:p>
+          <a:p>
+            <a:pPr marL="0" indent="0">
+              <a:buNone/>
+            </a:pPr>
+            <a:r>
+              <a:rPr lang="en-US" dirty="0"/>
+              <a:t>I was the </a:t>
+            </a:r>
+            <a:r>
+              <a:rPr lang="en-US" dirty="0" smtClean="0">
+                <a:latin typeface="Lato Black"/>
+                <a:cs typeface="Lato Black"/>
+              </a:rPr>
+              <a:t>User Experience Designer </a:t>
+            </a:r>
+            <a:r>
+              <a:rPr lang="en-US" dirty="0"/>
+              <a:t>on this project. In addition to completing a </a:t>
+            </a:r>
+            <a:r>
+              <a:rPr lang="en-US" dirty="0">
+                <a:latin typeface="Lato Black"/>
+                <a:cs typeface="Lato Black"/>
+              </a:rPr>
+              <a:t>heuristic review </a:t>
+            </a:r>
+            <a:r>
+              <a:rPr lang="en-US" dirty="0"/>
+              <a:t>of the existing request system, I </a:t>
+            </a:r>
+            <a:r>
+              <a:rPr lang="en-US" dirty="0">
+                <a:latin typeface="Lato Black"/>
+                <a:cs typeface="Lato Black"/>
+              </a:rPr>
+              <a:t>interviewed</a:t>
+            </a:r>
+            <a:r>
+              <a:rPr lang="en-US" dirty="0"/>
+              <a:t> many users of the current site to understand their </a:t>
+            </a:r>
+            <a:r>
+              <a:rPr lang="en-US" dirty="0">
+                <a:latin typeface="Lato Black"/>
+                <a:cs typeface="Lato Black"/>
+              </a:rPr>
+              <a:t>pain points </a:t>
+            </a:r>
+            <a:r>
+              <a:rPr lang="en-US" dirty="0"/>
+              <a:t>and difficulties in preparation for designing the new tracker.</a:t>
+            </a:r>
+          </a:p>
+          <a:p>
+            <a:endParaRPr lang="en-US" dirty="0"/>
+          </a:p>
+        </p:txBody>
+      </p:sp>
+    </p:spTree>
+    <p:extLst>
+      <p:ext uri="{BB962C8B-B14F-4D97-AF65-F5344CB8AC3E}">
+        <p14:creationId xmlns:p14="http://schemas.microsoft.com/office/powerpoint/2010/main" val="1931790834"/>
+      </p:ext>
+    </p:extLst>
+  </p:cSld>
+  <p:clrMapOvr>
+    <a:masterClrMapping/>
+  </p:clrMapOvr>
+  <p:timing>
+    <p:tnLst>
+      <p:par>
+        <p:cTn xmlns:p14="http://schemas.microsoft.com/office/powerpoint/2010/main" id="1" dur="indefinite" restart="never" nodeType="tmRoot"/>
+      </p:par>
+    </p:tnLst>
+  </p:timing>
+</p:sld>
+</file>
+
 <file path=ppt/slides/slide2.xml><?xml version="1.0" encoding="utf-8"?>
 <p:sld xmlns:a="http://schemas.openxmlformats.org/drawingml/2006/main" xmlns:r="http://schemas.openxmlformats.org/officeDocument/2006/relationships" xmlns:p="http://schemas.openxmlformats.org/presentationml/2006/main">
   <p:cSld>
@@ -3766,6 +6338,934 @@
       </p:par>
     </p:tnLst>
   </p:timing>
+</p:sld>
+</file>
+
+<file path=ppt/slides/slide20.xml><?xml version="1.0" encoding="utf-8"?>
+<p:sld xmlns:a="http://schemas.openxmlformats.org/drawingml/2006/main" xmlns:r="http://schemas.openxmlformats.org/officeDocument/2006/relationships" xmlns:p="http://schemas.openxmlformats.org/presentationml/2006/main">
+  <p:cSld>
+    <p:spTree>
+      <p:nvGrpSpPr>
+        <p:cNvPr id="1" name=""/>
+        <p:cNvGrpSpPr/>
+        <p:nvPr/>
+      </p:nvGrpSpPr>
+      <p:grpSpPr>
+        <a:xfrm>
+          <a:off x="0" y="0"/>
+          <a:ext cx="0" cy="0"/>
+          <a:chOff x="0" y="0"/>
+          <a:chExt cx="0" cy="0"/>
+        </a:xfrm>
+      </p:grpSpPr>
+      <p:sp>
+        <p:nvSpPr>
+          <p:cNvPr id="2" name="Content Placeholder 1"/>
+          <p:cNvSpPr>
+            <a:spLocks noGrp="1"/>
+          </p:cNvSpPr>
+          <p:nvPr>
+            <p:ph idx="1"/>
+          </p:nvPr>
+        </p:nvSpPr>
+        <p:spPr>
+          <a:xfrm>
+            <a:off x="457200" y="874513"/>
+            <a:ext cx="4117360" cy="3774791"/>
+          </a:xfrm>
+        </p:spPr>
+        <p:txBody>
+          <a:bodyPr>
+            <a:noAutofit/>
+          </a:bodyPr>
+          <a:lstStyle/>
+          <a:p>
+            <a:pPr marL="0" indent="0">
+              <a:buNone/>
+            </a:pPr>
+            <a:r>
+              <a:rPr lang="en-US" sz="1400" dirty="0" smtClean="0"/>
+              <a:t>Primary User</a:t>
+            </a:r>
+          </a:p>
+          <a:p>
+            <a:pPr marL="0" indent="0">
+              <a:buNone/>
+            </a:pPr>
+            <a:r>
+              <a:rPr lang="en-US" sz="2200" dirty="0" smtClean="0">
+                <a:latin typeface="Lato Black"/>
+                <a:cs typeface="Lato Black"/>
+              </a:rPr>
+              <a:t>Submitter</a:t>
+            </a:r>
+            <a:endParaRPr lang="en-US" sz="2200" dirty="0" smtClean="0">
+              <a:latin typeface="Lato Black"/>
+              <a:cs typeface="Lato Black"/>
+            </a:endParaRPr>
+          </a:p>
+          <a:p>
+            <a:pPr marL="0" indent="0">
+              <a:buNone/>
+            </a:pPr>
+            <a:endParaRPr lang="en-US" sz="1100" dirty="0" smtClean="0"/>
+          </a:p>
+          <a:p>
+            <a:pPr marL="0" indent="0">
+              <a:buNone/>
+            </a:pPr>
+            <a:r>
+              <a:rPr lang="en-US" sz="1400" dirty="0" smtClean="0"/>
+              <a:t>Primary Goal</a:t>
+            </a:r>
+          </a:p>
+          <a:p>
+            <a:pPr marL="0" indent="0">
+              <a:buNone/>
+            </a:pPr>
+            <a:r>
+              <a:rPr lang="en-US" sz="2200" dirty="0" smtClean="0">
+                <a:latin typeface="Lato Black"/>
+                <a:cs typeface="Lato Black"/>
+              </a:rPr>
+              <a:t>Request time off through the portal and view upcoming time off and days remaining</a:t>
+            </a:r>
+          </a:p>
+          <a:p>
+            <a:pPr marL="0" indent="0">
+              <a:buNone/>
+            </a:pPr>
+            <a:endParaRPr lang="en-US" sz="1100" dirty="0">
+              <a:latin typeface="Lato Black"/>
+              <a:cs typeface="Lato Black"/>
+            </a:endParaRPr>
+          </a:p>
+          <a:p>
+            <a:pPr marL="0" indent="0">
+              <a:buNone/>
+            </a:pPr>
+            <a:r>
+              <a:rPr lang="en-US" sz="1400" dirty="0" smtClean="0"/>
+              <a:t>Secondary Goal</a:t>
+            </a:r>
+          </a:p>
+          <a:p>
+            <a:pPr marL="0" indent="0">
+              <a:buNone/>
+            </a:pPr>
+            <a:r>
+              <a:rPr lang="en-US" sz="2200" dirty="0" smtClean="0">
+                <a:latin typeface="Lato Black"/>
+                <a:cs typeface="Lato Black"/>
+              </a:rPr>
+              <a:t>Ability to </a:t>
+            </a:r>
+            <a:r>
+              <a:rPr lang="en-US" sz="2200" dirty="0">
+                <a:latin typeface="Lato Black"/>
+                <a:cs typeface="Lato Black"/>
+              </a:rPr>
+              <a:t>v</a:t>
+            </a:r>
+            <a:r>
+              <a:rPr lang="en-US" sz="2200" dirty="0" smtClean="0">
+                <a:latin typeface="Lato Black"/>
+                <a:cs typeface="Lato Black"/>
+              </a:rPr>
+              <a:t>iew team’s upcoming time off</a:t>
+            </a:r>
+            <a:endParaRPr lang="en-US" sz="2200" dirty="0">
+              <a:latin typeface="Lato Black"/>
+              <a:cs typeface="Lato Black"/>
+            </a:endParaRPr>
+          </a:p>
+          <a:p>
+            <a:pPr marL="0" indent="0">
+              <a:buNone/>
+            </a:pPr>
+            <a:endParaRPr lang="en-US" sz="2800" dirty="0" smtClean="0">
+              <a:latin typeface="Lato Black"/>
+              <a:cs typeface="Lato Black"/>
+            </a:endParaRPr>
+          </a:p>
+          <a:p>
+            <a:pPr marL="0" indent="0">
+              <a:buNone/>
+            </a:pPr>
+            <a:endParaRPr lang="en-US" dirty="0" smtClean="0">
+              <a:latin typeface="Lato Black"/>
+              <a:cs typeface="Lato Black"/>
+            </a:endParaRPr>
+          </a:p>
+          <a:p>
+            <a:pPr marL="0" indent="0">
+              <a:buNone/>
+            </a:pPr>
+            <a:endParaRPr lang="en-US" sz="1400" dirty="0"/>
+          </a:p>
+        </p:txBody>
+      </p:sp>
+      <p:sp>
+        <p:nvSpPr>
+          <p:cNvPr id="3" name="Content Placeholder 1"/>
+          <p:cNvSpPr txBox="1">
+            <a:spLocks/>
+          </p:cNvSpPr>
+          <p:nvPr/>
+        </p:nvSpPr>
+        <p:spPr>
+          <a:xfrm>
+            <a:off x="4574560" y="874514"/>
+            <a:ext cx="4117360" cy="3394472"/>
+          </a:xfrm>
+          <a:prstGeom prst="rect">
+            <a:avLst/>
+          </a:prstGeom>
+        </p:spPr>
+        <p:txBody>
+          <a:bodyPr vert="horz" lIns="91440" tIns="45720" rIns="91440" bIns="45720" rtlCol="0">
+            <a:normAutofit/>
+          </a:bodyPr>
+          <a:lstStyle>
+            <a:lvl1pPr marL="342900" indent="-342900" algn="l" defTabSz="457200" rtl="0" eaLnBrk="1" latinLnBrk="0" hangingPunct="1">
+              <a:spcBef>
+                <a:spcPct val="20000"/>
+              </a:spcBef>
+              <a:buFont typeface="Arial"/>
+              <a:buChar char="•"/>
+              <a:defRPr sz="3200" kern="1200">
+                <a:solidFill>
+                  <a:schemeClr val="bg1"/>
+                </a:solidFill>
+                <a:latin typeface="Lato Light"/>
+                <a:ea typeface="+mn-ea"/>
+                <a:cs typeface="Lato Light"/>
+              </a:defRPr>
+            </a:lvl1pPr>
+            <a:lvl2pPr marL="742950" indent="-285750" algn="l" defTabSz="457200" rtl="0" eaLnBrk="1" latinLnBrk="0" hangingPunct="1">
+              <a:spcBef>
+                <a:spcPct val="20000"/>
+              </a:spcBef>
+              <a:buFont typeface="Arial"/>
+              <a:buChar char="–"/>
+              <a:defRPr sz="2800" kern="1200">
+                <a:solidFill>
+                  <a:schemeClr val="bg1"/>
+                </a:solidFill>
+                <a:latin typeface="Lato Light"/>
+                <a:ea typeface="+mn-ea"/>
+                <a:cs typeface="Lato Light"/>
+              </a:defRPr>
+            </a:lvl2pPr>
+            <a:lvl3pPr marL="1143000" indent="-228600" algn="l" defTabSz="457200" rtl="0" eaLnBrk="1" latinLnBrk="0" hangingPunct="1">
+              <a:spcBef>
+                <a:spcPct val="20000"/>
+              </a:spcBef>
+              <a:buFont typeface="Arial"/>
+              <a:buChar char="•"/>
+              <a:defRPr sz="2400" kern="1200">
+                <a:solidFill>
+                  <a:schemeClr val="bg1"/>
+                </a:solidFill>
+                <a:latin typeface="Lato Light"/>
+                <a:ea typeface="+mn-ea"/>
+                <a:cs typeface="Lato Light"/>
+              </a:defRPr>
+            </a:lvl3pPr>
+            <a:lvl4pPr marL="1600200" indent="-228600" algn="l" defTabSz="457200" rtl="0" eaLnBrk="1" latinLnBrk="0" hangingPunct="1">
+              <a:spcBef>
+                <a:spcPct val="20000"/>
+              </a:spcBef>
+              <a:buFont typeface="Arial"/>
+              <a:buChar char="–"/>
+              <a:defRPr sz="2000" kern="1200">
+                <a:solidFill>
+                  <a:schemeClr val="bg1"/>
+                </a:solidFill>
+                <a:latin typeface="Lato Light"/>
+                <a:ea typeface="+mn-ea"/>
+                <a:cs typeface="Lato Light"/>
+              </a:defRPr>
+            </a:lvl4pPr>
+            <a:lvl5pPr marL="2057400" indent="-228600" algn="l" defTabSz="457200" rtl="0" eaLnBrk="1" latinLnBrk="0" hangingPunct="1">
+              <a:spcBef>
+                <a:spcPct val="20000"/>
+              </a:spcBef>
+              <a:buFont typeface="Arial"/>
+              <a:buChar char="»"/>
+              <a:defRPr sz="2000" kern="1200">
+                <a:solidFill>
+                  <a:schemeClr val="bg1"/>
+                </a:solidFill>
+                <a:latin typeface="Lato Light"/>
+                <a:ea typeface="+mn-ea"/>
+                <a:cs typeface="Lato Light"/>
+              </a:defRPr>
+            </a:lvl5pPr>
+            <a:lvl6pPr marL="2514600" indent="-228600" algn="l" defTabSz="457200" rtl="0" eaLnBrk="1" latinLnBrk="0" hangingPunct="1">
+              <a:spcBef>
+                <a:spcPct val="20000"/>
+              </a:spcBef>
+              <a:buFont typeface="Arial"/>
+              <a:buChar char="•"/>
+              <a:defRPr sz="2000" kern="1200">
+                <a:solidFill>
+                  <a:schemeClr val="tx1"/>
+                </a:solidFill>
+                <a:latin typeface="+mn-lt"/>
+                <a:ea typeface="+mn-ea"/>
+                <a:cs typeface="+mn-cs"/>
+              </a:defRPr>
+            </a:lvl6pPr>
+            <a:lvl7pPr marL="2971800" indent="-228600" algn="l" defTabSz="457200" rtl="0" eaLnBrk="1" latinLnBrk="0" hangingPunct="1">
+              <a:spcBef>
+                <a:spcPct val="20000"/>
+              </a:spcBef>
+              <a:buFont typeface="Arial"/>
+              <a:buChar char="•"/>
+              <a:defRPr sz="2000" kern="1200">
+                <a:solidFill>
+                  <a:schemeClr val="tx1"/>
+                </a:solidFill>
+                <a:latin typeface="+mn-lt"/>
+                <a:ea typeface="+mn-ea"/>
+                <a:cs typeface="+mn-cs"/>
+              </a:defRPr>
+            </a:lvl7pPr>
+            <a:lvl8pPr marL="3429000" indent="-228600" algn="l" defTabSz="457200" rtl="0" eaLnBrk="1" latinLnBrk="0" hangingPunct="1">
+              <a:spcBef>
+                <a:spcPct val="20000"/>
+              </a:spcBef>
+              <a:buFont typeface="Arial"/>
+              <a:buChar char="•"/>
+              <a:defRPr sz="2000" kern="1200">
+                <a:solidFill>
+                  <a:schemeClr val="tx1"/>
+                </a:solidFill>
+                <a:latin typeface="+mn-lt"/>
+                <a:ea typeface="+mn-ea"/>
+                <a:cs typeface="+mn-cs"/>
+              </a:defRPr>
+            </a:lvl8pPr>
+            <a:lvl9pPr marL="3886200" indent="-228600" algn="l" defTabSz="457200" rtl="0" eaLnBrk="1" latinLnBrk="0" hangingPunct="1">
+              <a:spcBef>
+                <a:spcPct val="20000"/>
+              </a:spcBef>
+              <a:buFont typeface="Arial"/>
+              <a:buChar char="•"/>
+              <a:defRPr sz="2000" kern="1200">
+                <a:solidFill>
+                  <a:schemeClr val="tx1"/>
+                </a:solidFill>
+                <a:latin typeface="+mn-lt"/>
+                <a:ea typeface="+mn-ea"/>
+                <a:cs typeface="+mn-cs"/>
+              </a:defRPr>
+            </a:lvl9pPr>
+          </a:lstStyle>
+          <a:p>
+            <a:endParaRPr lang="en-US" dirty="0"/>
+          </a:p>
+        </p:txBody>
+      </p:sp>
+      <p:sp>
+        <p:nvSpPr>
+          <p:cNvPr id="4" name="Content Placeholder 1"/>
+          <p:cNvSpPr txBox="1">
+            <a:spLocks/>
+          </p:cNvSpPr>
+          <p:nvPr/>
+        </p:nvSpPr>
+        <p:spPr>
+          <a:xfrm>
+            <a:off x="4574560" y="881820"/>
+            <a:ext cx="4117360" cy="3394472"/>
+          </a:xfrm>
+          <a:prstGeom prst="rect">
+            <a:avLst/>
+          </a:prstGeom>
+        </p:spPr>
+        <p:txBody>
+          <a:bodyPr vert="horz" lIns="91440" tIns="45720" rIns="91440" bIns="45720" rtlCol="0">
+            <a:normAutofit/>
+          </a:bodyPr>
+          <a:lstStyle>
+            <a:lvl1pPr marL="342900" indent="-342900" algn="l" defTabSz="457200" rtl="0" eaLnBrk="1" latinLnBrk="0" hangingPunct="1">
+              <a:spcBef>
+                <a:spcPct val="20000"/>
+              </a:spcBef>
+              <a:buFont typeface="Arial"/>
+              <a:buChar char="•"/>
+              <a:defRPr sz="3200" kern="1200">
+                <a:solidFill>
+                  <a:schemeClr val="bg1"/>
+                </a:solidFill>
+                <a:latin typeface="Lato Light"/>
+                <a:ea typeface="+mn-ea"/>
+                <a:cs typeface="Lato Light"/>
+              </a:defRPr>
+            </a:lvl1pPr>
+            <a:lvl2pPr marL="742950" indent="-285750" algn="l" defTabSz="457200" rtl="0" eaLnBrk="1" latinLnBrk="0" hangingPunct="1">
+              <a:spcBef>
+                <a:spcPct val="20000"/>
+              </a:spcBef>
+              <a:buFont typeface="Arial"/>
+              <a:buChar char="–"/>
+              <a:defRPr sz="2800" kern="1200">
+                <a:solidFill>
+                  <a:schemeClr val="bg1"/>
+                </a:solidFill>
+                <a:latin typeface="Lato Light"/>
+                <a:ea typeface="+mn-ea"/>
+                <a:cs typeface="Lato Light"/>
+              </a:defRPr>
+            </a:lvl2pPr>
+            <a:lvl3pPr marL="1143000" indent="-228600" algn="l" defTabSz="457200" rtl="0" eaLnBrk="1" latinLnBrk="0" hangingPunct="1">
+              <a:spcBef>
+                <a:spcPct val="20000"/>
+              </a:spcBef>
+              <a:buFont typeface="Arial"/>
+              <a:buChar char="•"/>
+              <a:defRPr sz="2400" kern="1200">
+                <a:solidFill>
+                  <a:schemeClr val="bg1"/>
+                </a:solidFill>
+                <a:latin typeface="Lato Light"/>
+                <a:ea typeface="+mn-ea"/>
+                <a:cs typeface="Lato Light"/>
+              </a:defRPr>
+            </a:lvl3pPr>
+            <a:lvl4pPr marL="1600200" indent="-228600" algn="l" defTabSz="457200" rtl="0" eaLnBrk="1" latinLnBrk="0" hangingPunct="1">
+              <a:spcBef>
+                <a:spcPct val="20000"/>
+              </a:spcBef>
+              <a:buFont typeface="Arial"/>
+              <a:buChar char="–"/>
+              <a:defRPr sz="2000" kern="1200">
+                <a:solidFill>
+                  <a:schemeClr val="bg1"/>
+                </a:solidFill>
+                <a:latin typeface="Lato Light"/>
+                <a:ea typeface="+mn-ea"/>
+                <a:cs typeface="Lato Light"/>
+              </a:defRPr>
+            </a:lvl4pPr>
+            <a:lvl5pPr marL="2057400" indent="-228600" algn="l" defTabSz="457200" rtl="0" eaLnBrk="1" latinLnBrk="0" hangingPunct="1">
+              <a:spcBef>
+                <a:spcPct val="20000"/>
+              </a:spcBef>
+              <a:buFont typeface="Arial"/>
+              <a:buChar char="»"/>
+              <a:defRPr sz="2000" kern="1200">
+                <a:solidFill>
+                  <a:schemeClr val="bg1"/>
+                </a:solidFill>
+                <a:latin typeface="Lato Light"/>
+                <a:ea typeface="+mn-ea"/>
+                <a:cs typeface="Lato Light"/>
+              </a:defRPr>
+            </a:lvl5pPr>
+            <a:lvl6pPr marL="2514600" indent="-228600" algn="l" defTabSz="457200" rtl="0" eaLnBrk="1" latinLnBrk="0" hangingPunct="1">
+              <a:spcBef>
+                <a:spcPct val="20000"/>
+              </a:spcBef>
+              <a:buFont typeface="Arial"/>
+              <a:buChar char="•"/>
+              <a:defRPr sz="2000" kern="1200">
+                <a:solidFill>
+                  <a:schemeClr val="tx1"/>
+                </a:solidFill>
+                <a:latin typeface="+mn-lt"/>
+                <a:ea typeface="+mn-ea"/>
+                <a:cs typeface="+mn-cs"/>
+              </a:defRPr>
+            </a:lvl6pPr>
+            <a:lvl7pPr marL="2971800" indent="-228600" algn="l" defTabSz="457200" rtl="0" eaLnBrk="1" latinLnBrk="0" hangingPunct="1">
+              <a:spcBef>
+                <a:spcPct val="20000"/>
+              </a:spcBef>
+              <a:buFont typeface="Arial"/>
+              <a:buChar char="•"/>
+              <a:defRPr sz="2000" kern="1200">
+                <a:solidFill>
+                  <a:schemeClr val="tx1"/>
+                </a:solidFill>
+                <a:latin typeface="+mn-lt"/>
+                <a:ea typeface="+mn-ea"/>
+                <a:cs typeface="+mn-cs"/>
+              </a:defRPr>
+            </a:lvl7pPr>
+            <a:lvl8pPr marL="3429000" indent="-228600" algn="l" defTabSz="457200" rtl="0" eaLnBrk="1" latinLnBrk="0" hangingPunct="1">
+              <a:spcBef>
+                <a:spcPct val="20000"/>
+              </a:spcBef>
+              <a:buFont typeface="Arial"/>
+              <a:buChar char="•"/>
+              <a:defRPr sz="2000" kern="1200">
+                <a:solidFill>
+                  <a:schemeClr val="tx1"/>
+                </a:solidFill>
+                <a:latin typeface="+mn-lt"/>
+                <a:ea typeface="+mn-ea"/>
+                <a:cs typeface="+mn-cs"/>
+              </a:defRPr>
+            </a:lvl8pPr>
+            <a:lvl9pPr marL="3886200" indent="-228600" algn="l" defTabSz="457200" rtl="0" eaLnBrk="1" latinLnBrk="0" hangingPunct="1">
+              <a:spcBef>
+                <a:spcPct val="20000"/>
+              </a:spcBef>
+              <a:buFont typeface="Arial"/>
+              <a:buChar char="•"/>
+              <a:defRPr sz="2000" kern="1200">
+                <a:solidFill>
+                  <a:schemeClr val="tx1"/>
+                </a:solidFill>
+                <a:latin typeface="+mn-lt"/>
+                <a:ea typeface="+mn-ea"/>
+                <a:cs typeface="+mn-cs"/>
+              </a:defRPr>
+            </a:lvl9pPr>
+          </a:lstStyle>
+          <a:p>
+            <a:endParaRPr lang="en-US" dirty="0"/>
+          </a:p>
+        </p:txBody>
+      </p:sp>
+      <p:sp>
+        <p:nvSpPr>
+          <p:cNvPr id="6" name="Content Placeholder 1"/>
+          <p:cNvSpPr txBox="1">
+            <a:spLocks/>
+          </p:cNvSpPr>
+          <p:nvPr/>
+        </p:nvSpPr>
+        <p:spPr>
+          <a:xfrm>
+            <a:off x="4574560" y="874514"/>
+            <a:ext cx="4117360" cy="3774790"/>
+          </a:xfrm>
+          <a:prstGeom prst="rect">
+            <a:avLst/>
+          </a:prstGeom>
+        </p:spPr>
+        <p:txBody>
+          <a:bodyPr vert="horz" lIns="91440" tIns="45720" rIns="91440" bIns="45720" rtlCol="0">
+            <a:normAutofit/>
+          </a:bodyPr>
+          <a:lstStyle>
+            <a:lvl1pPr marL="342900" indent="-342900" algn="l" defTabSz="457200" rtl="0" eaLnBrk="1" latinLnBrk="0" hangingPunct="1">
+              <a:spcBef>
+                <a:spcPct val="20000"/>
+              </a:spcBef>
+              <a:buFont typeface="Arial"/>
+              <a:buChar char="•"/>
+              <a:defRPr sz="3200" kern="1200">
+                <a:solidFill>
+                  <a:schemeClr val="bg1"/>
+                </a:solidFill>
+                <a:latin typeface="Lato Light"/>
+                <a:ea typeface="+mn-ea"/>
+                <a:cs typeface="Lato Light"/>
+              </a:defRPr>
+            </a:lvl1pPr>
+            <a:lvl2pPr marL="742950" indent="-285750" algn="l" defTabSz="457200" rtl="0" eaLnBrk="1" latinLnBrk="0" hangingPunct="1">
+              <a:spcBef>
+                <a:spcPct val="20000"/>
+              </a:spcBef>
+              <a:buFont typeface="Arial"/>
+              <a:buChar char="–"/>
+              <a:defRPr sz="2800" kern="1200">
+                <a:solidFill>
+                  <a:schemeClr val="bg1"/>
+                </a:solidFill>
+                <a:latin typeface="Lato Light"/>
+                <a:ea typeface="+mn-ea"/>
+                <a:cs typeface="Lato Light"/>
+              </a:defRPr>
+            </a:lvl2pPr>
+            <a:lvl3pPr marL="1143000" indent="-228600" algn="l" defTabSz="457200" rtl="0" eaLnBrk="1" latinLnBrk="0" hangingPunct="1">
+              <a:spcBef>
+                <a:spcPct val="20000"/>
+              </a:spcBef>
+              <a:buFont typeface="Arial"/>
+              <a:buChar char="•"/>
+              <a:defRPr sz="2400" kern="1200">
+                <a:solidFill>
+                  <a:schemeClr val="bg1"/>
+                </a:solidFill>
+                <a:latin typeface="Lato Light"/>
+                <a:ea typeface="+mn-ea"/>
+                <a:cs typeface="Lato Light"/>
+              </a:defRPr>
+            </a:lvl3pPr>
+            <a:lvl4pPr marL="1600200" indent="-228600" algn="l" defTabSz="457200" rtl="0" eaLnBrk="1" latinLnBrk="0" hangingPunct="1">
+              <a:spcBef>
+                <a:spcPct val="20000"/>
+              </a:spcBef>
+              <a:buFont typeface="Arial"/>
+              <a:buChar char="–"/>
+              <a:defRPr sz="2000" kern="1200">
+                <a:solidFill>
+                  <a:schemeClr val="bg1"/>
+                </a:solidFill>
+                <a:latin typeface="Lato Light"/>
+                <a:ea typeface="+mn-ea"/>
+                <a:cs typeface="Lato Light"/>
+              </a:defRPr>
+            </a:lvl4pPr>
+            <a:lvl5pPr marL="2057400" indent="-228600" algn="l" defTabSz="457200" rtl="0" eaLnBrk="1" latinLnBrk="0" hangingPunct="1">
+              <a:spcBef>
+                <a:spcPct val="20000"/>
+              </a:spcBef>
+              <a:buFont typeface="Arial"/>
+              <a:buChar char="»"/>
+              <a:defRPr sz="2000" kern="1200">
+                <a:solidFill>
+                  <a:schemeClr val="bg1"/>
+                </a:solidFill>
+                <a:latin typeface="Lato Light"/>
+                <a:ea typeface="+mn-ea"/>
+                <a:cs typeface="Lato Light"/>
+              </a:defRPr>
+            </a:lvl5pPr>
+            <a:lvl6pPr marL="2514600" indent="-228600" algn="l" defTabSz="457200" rtl="0" eaLnBrk="1" latinLnBrk="0" hangingPunct="1">
+              <a:spcBef>
+                <a:spcPct val="20000"/>
+              </a:spcBef>
+              <a:buFont typeface="Arial"/>
+              <a:buChar char="•"/>
+              <a:defRPr sz="2000" kern="1200">
+                <a:solidFill>
+                  <a:schemeClr val="tx1"/>
+                </a:solidFill>
+                <a:latin typeface="+mn-lt"/>
+                <a:ea typeface="+mn-ea"/>
+                <a:cs typeface="+mn-cs"/>
+              </a:defRPr>
+            </a:lvl6pPr>
+            <a:lvl7pPr marL="2971800" indent="-228600" algn="l" defTabSz="457200" rtl="0" eaLnBrk="1" latinLnBrk="0" hangingPunct="1">
+              <a:spcBef>
+                <a:spcPct val="20000"/>
+              </a:spcBef>
+              <a:buFont typeface="Arial"/>
+              <a:buChar char="•"/>
+              <a:defRPr sz="2000" kern="1200">
+                <a:solidFill>
+                  <a:schemeClr val="tx1"/>
+                </a:solidFill>
+                <a:latin typeface="+mn-lt"/>
+                <a:ea typeface="+mn-ea"/>
+                <a:cs typeface="+mn-cs"/>
+              </a:defRPr>
+            </a:lvl7pPr>
+            <a:lvl8pPr marL="3429000" indent="-228600" algn="l" defTabSz="457200" rtl="0" eaLnBrk="1" latinLnBrk="0" hangingPunct="1">
+              <a:spcBef>
+                <a:spcPct val="20000"/>
+              </a:spcBef>
+              <a:buFont typeface="Arial"/>
+              <a:buChar char="•"/>
+              <a:defRPr sz="2000" kern="1200">
+                <a:solidFill>
+                  <a:schemeClr val="tx1"/>
+                </a:solidFill>
+                <a:latin typeface="+mn-lt"/>
+                <a:ea typeface="+mn-ea"/>
+                <a:cs typeface="+mn-cs"/>
+              </a:defRPr>
+            </a:lvl8pPr>
+            <a:lvl9pPr marL="3886200" indent="-228600" algn="l" defTabSz="457200" rtl="0" eaLnBrk="1" latinLnBrk="0" hangingPunct="1">
+              <a:spcBef>
+                <a:spcPct val="20000"/>
+              </a:spcBef>
+              <a:buFont typeface="Arial"/>
+              <a:buChar char="•"/>
+              <a:defRPr sz="2000" kern="1200">
+                <a:solidFill>
+                  <a:schemeClr val="tx1"/>
+                </a:solidFill>
+                <a:latin typeface="+mn-lt"/>
+                <a:ea typeface="+mn-ea"/>
+                <a:cs typeface="+mn-cs"/>
+              </a:defRPr>
+            </a:lvl9pPr>
+          </a:lstStyle>
+          <a:p>
+            <a:pPr marL="0" indent="0">
+              <a:buFont typeface="Arial"/>
+              <a:buNone/>
+            </a:pPr>
+            <a:r>
+              <a:rPr lang="en-US" sz="1400" dirty="0" smtClean="0"/>
+              <a:t>Secondary User</a:t>
+            </a:r>
+          </a:p>
+          <a:p>
+            <a:pPr marL="0" indent="0">
+              <a:buFont typeface="Arial"/>
+              <a:buNone/>
+            </a:pPr>
+            <a:r>
+              <a:rPr lang="en-US" sz="2200" dirty="0" smtClean="0">
+                <a:latin typeface="Lato Black"/>
+                <a:cs typeface="Lato Black"/>
+              </a:rPr>
+              <a:t>Approver</a:t>
+            </a:r>
+          </a:p>
+          <a:p>
+            <a:pPr marL="0" indent="0">
+              <a:buNone/>
+            </a:pPr>
+            <a:endParaRPr lang="en-US" sz="1100" dirty="0" smtClean="0"/>
+          </a:p>
+          <a:p>
+            <a:pPr marL="0" indent="0">
+              <a:buNone/>
+            </a:pPr>
+            <a:r>
+              <a:rPr lang="en-US" sz="1400" dirty="0" smtClean="0"/>
+              <a:t>Primary Goal</a:t>
+            </a:r>
+          </a:p>
+          <a:p>
+            <a:pPr marL="0" indent="0">
+              <a:buNone/>
+            </a:pPr>
+            <a:r>
+              <a:rPr lang="en-US" sz="2200" dirty="0" smtClean="0">
+                <a:latin typeface="Lato Black"/>
+                <a:cs typeface="Lato Black"/>
+              </a:rPr>
+              <a:t>Review and approve time off requests, and view direct reports’ upcoming time off</a:t>
+            </a:r>
+          </a:p>
+          <a:p>
+            <a:pPr marL="0" indent="0">
+              <a:buNone/>
+            </a:pPr>
+            <a:endParaRPr lang="en-US" sz="1100" dirty="0">
+              <a:latin typeface="Lato Black"/>
+              <a:cs typeface="Lato Black"/>
+            </a:endParaRPr>
+          </a:p>
+          <a:p>
+            <a:pPr marL="0" indent="0">
+              <a:buNone/>
+            </a:pPr>
+            <a:r>
+              <a:rPr lang="en-US" sz="1400" dirty="0" smtClean="0"/>
+              <a:t>Secondary Goal</a:t>
+            </a:r>
+          </a:p>
+          <a:p>
+            <a:pPr marL="0" indent="0">
+              <a:buNone/>
+            </a:pPr>
+            <a:r>
+              <a:rPr lang="en-US" sz="2200" dirty="0" smtClean="0">
+                <a:latin typeface="Lato Black"/>
+                <a:cs typeface="Lato Black"/>
+              </a:rPr>
+              <a:t>All tasks of Submitter persona</a:t>
+            </a:r>
+            <a:endParaRPr lang="en-US" sz="2200" dirty="0" smtClean="0">
+              <a:latin typeface="Lato Black"/>
+              <a:cs typeface="Lato Black"/>
+            </a:endParaRPr>
+          </a:p>
+          <a:p>
+            <a:pPr marL="0" indent="0">
+              <a:buFont typeface="Arial"/>
+              <a:buNone/>
+            </a:pPr>
+            <a:endParaRPr lang="en-US" dirty="0" smtClean="0">
+              <a:latin typeface="Lato Black"/>
+              <a:cs typeface="Lato Black"/>
+            </a:endParaRPr>
+          </a:p>
+        </p:txBody>
+      </p:sp>
+    </p:spTree>
+    <p:extLst>
+      <p:ext uri="{BB962C8B-B14F-4D97-AF65-F5344CB8AC3E}">
+        <p14:creationId xmlns:p14="http://schemas.microsoft.com/office/powerpoint/2010/main" val="1038836723"/>
+      </p:ext>
+    </p:extLst>
+  </p:cSld>
+  <p:clrMapOvr>
+    <a:masterClrMapping/>
+  </p:clrMapOvr>
+  <p:timing>
+    <p:tnLst>
+      <p:par>
+        <p:cTn xmlns:p14="http://schemas.microsoft.com/office/powerpoint/2010/main" id="1" dur="indefinite" restart="never" nodeType="tmRoot"/>
+      </p:par>
+    </p:tnLst>
+  </p:timing>
+</p:sld>
+</file>
+
+<file path=ppt/slides/slide21.xml><?xml version="1.0" encoding="utf-8"?>
+<p:sld xmlns:a="http://schemas.openxmlformats.org/drawingml/2006/main" xmlns:r="http://schemas.openxmlformats.org/officeDocument/2006/relationships" xmlns:p="http://schemas.openxmlformats.org/presentationml/2006/main">
+  <p:cSld>
+    <p:spTree>
+      <p:nvGrpSpPr>
+        <p:cNvPr id="1" name=""/>
+        <p:cNvGrpSpPr/>
+        <p:nvPr/>
+      </p:nvGrpSpPr>
+      <p:grpSpPr>
+        <a:xfrm>
+          <a:off x="0" y="0"/>
+          <a:ext cx="0" cy="0"/>
+          <a:chOff x="0" y="0"/>
+          <a:chExt cx="0" cy="0"/>
+        </a:xfrm>
+      </p:grpSpPr>
+      <p:sp>
+        <p:nvSpPr>
+          <p:cNvPr id="2" name="Content Placeholder 1"/>
+          <p:cNvSpPr>
+            <a:spLocks noGrp="1"/>
+          </p:cNvSpPr>
+          <p:nvPr>
+            <p:ph idx="1"/>
+          </p:nvPr>
+        </p:nvSpPr>
+        <p:spPr>
+          <a:xfrm>
+            <a:off x="457200" y="874513"/>
+            <a:ext cx="8229600" cy="3614757"/>
+          </a:xfrm>
+        </p:spPr>
+        <p:txBody>
+          <a:bodyPr>
+            <a:normAutofit/>
+          </a:bodyPr>
+          <a:lstStyle/>
+          <a:p>
+            <a:pPr marL="0" indent="0">
+              <a:buNone/>
+            </a:pPr>
+            <a:r>
+              <a:rPr lang="en-US" sz="1400" dirty="0" smtClean="0"/>
+              <a:t>Define the Problem</a:t>
+            </a:r>
+          </a:p>
+          <a:p>
+            <a:pPr marL="0" indent="0">
+              <a:buNone/>
+            </a:pPr>
+            <a:r>
+              <a:rPr lang="en-US" sz="3000" dirty="0">
+                <a:latin typeface="Lato Black"/>
+                <a:cs typeface="Lato Black"/>
+              </a:rPr>
+              <a:t>Submitters</a:t>
+            </a:r>
+            <a:r>
+              <a:rPr lang="en-US" sz="3000" dirty="0"/>
+              <a:t> need to be able to easily view upcoming time off, as well as request time off.</a:t>
+            </a:r>
+          </a:p>
+          <a:p>
+            <a:endParaRPr lang="en-US" sz="3000" dirty="0"/>
+          </a:p>
+          <a:p>
+            <a:pPr marL="0" indent="0">
+              <a:buNone/>
+            </a:pPr>
+            <a:r>
+              <a:rPr lang="en-US" sz="3000" dirty="0">
+                <a:latin typeface="Lato Black"/>
+                <a:cs typeface="Lato Black"/>
+              </a:rPr>
+              <a:t>Approvers</a:t>
+            </a:r>
+            <a:r>
+              <a:rPr lang="en-US" sz="3000" dirty="0"/>
+              <a:t> need to be able to easily view direct reports' vacation requests in order to approve vacation requests with minimal overlap.</a:t>
+            </a:r>
+            <a:endParaRPr lang="en-US" sz="3000" dirty="0"/>
+          </a:p>
+        </p:txBody>
+      </p:sp>
+    </p:spTree>
+    <p:extLst>
+      <p:ext uri="{BB962C8B-B14F-4D97-AF65-F5344CB8AC3E}">
+        <p14:creationId xmlns:p14="http://schemas.microsoft.com/office/powerpoint/2010/main" val="1392068255"/>
+      </p:ext>
+    </p:extLst>
+  </p:cSld>
+  <p:clrMapOvr>
+    <a:masterClrMapping/>
+  </p:clrMapOvr>
+  <p:timing>
+    <p:tnLst>
+      <p:par>
+        <p:cTn xmlns:p14="http://schemas.microsoft.com/office/powerpoint/2010/main" id="1" dur="indefinite" restart="never" nodeType="tmRoot"/>
+      </p:par>
+    </p:tnLst>
+  </p:timing>
+</p:sld>
+</file>
+
+<file path=ppt/slides/slide22.xml><?xml version="1.0" encoding="utf-8"?>
+<p:sld xmlns:a="http://schemas.openxmlformats.org/drawingml/2006/main" xmlns:r="http://schemas.openxmlformats.org/officeDocument/2006/relationships" xmlns:p="http://schemas.openxmlformats.org/presentationml/2006/main">
+  <p:cSld>
+    <p:spTree>
+      <p:nvGrpSpPr>
+        <p:cNvPr id="1" name=""/>
+        <p:cNvGrpSpPr/>
+        <p:nvPr/>
+      </p:nvGrpSpPr>
+      <p:grpSpPr>
+        <a:xfrm>
+          <a:off x="0" y="0"/>
+          <a:ext cx="0" cy="0"/>
+          <a:chOff x="0" y="0"/>
+          <a:chExt cx="0" cy="0"/>
+        </a:xfrm>
+      </p:grpSpPr>
+      <p:pic>
+        <p:nvPicPr>
+          <p:cNvPr id="4" name="Picture 3" descr="time2.jpg"/>
+          <p:cNvPicPr>
+            <a:picLocks noChangeAspect="1"/>
+          </p:cNvPicPr>
+          <p:nvPr/>
+        </p:nvPicPr>
+        <p:blipFill rotWithShape="1">
+          <a:blip r:embed="rId2">
+            <a:extLst>
+              <a:ext uri="{28A0092B-C50C-407E-A947-70E740481C1C}">
+                <a14:useLocalDpi xmlns:a14="http://schemas.microsoft.com/office/drawing/2010/main" val="0"/>
+              </a:ext>
+            </a:extLst>
+          </a:blip>
+          <a:srcRect t="6416" b="3909"/>
+          <a:stretch/>
+        </p:blipFill>
+        <p:spPr>
+          <a:xfrm>
+            <a:off x="0" y="-1"/>
+            <a:ext cx="9144000" cy="5526731"/>
+          </a:xfrm>
+          <a:prstGeom prst="rect">
+            <a:avLst/>
+          </a:prstGeom>
+        </p:spPr>
+      </p:pic>
+    </p:spTree>
+    <p:extLst>
+      <p:ext uri="{BB962C8B-B14F-4D97-AF65-F5344CB8AC3E}">
+        <p14:creationId xmlns:p14="http://schemas.microsoft.com/office/powerpoint/2010/main" val="1517136934"/>
+      </p:ext>
+    </p:extLst>
+  </p:cSld>
+  <p:clrMapOvr>
+    <a:masterClrMapping/>
+  </p:clrMapOvr>
 </p:sld>
 </file>
 

</xml_diff>